<commit_message>
Replaced MessagePack with simple byte structure for BLE packets
</commit_message>
<xml_diff>
--- a/resources/figures.pptx
+++ b/resources/figures.pptx
@@ -3061,60 +3061,6 @@
       </p:grpSpPr>
       <p:sp>
         <p:nvSpPr>
-          <p:cNvPr id="5" name="Rectangle 4"/>
-          <p:cNvSpPr/>
-          <p:nvPr/>
-        </p:nvSpPr>
-        <p:spPr>
-          <a:xfrm>
-            <a:off x="430013" y="2000146"/>
-            <a:ext cx="570013" cy="390028"/>
-          </a:xfrm>
-          <a:prstGeom prst="rect">
-            <a:avLst/>
-          </a:prstGeom>
-          <a:noFill/>
-          <a:ln w="19050" cmpd="sng">
-            <a:solidFill>
-              <a:schemeClr val="tx1"/>
-            </a:solidFill>
-          </a:ln>
-          <a:effectLst/>
-        </p:spPr>
-        <p:style>
-          <a:lnRef idx="1">
-            <a:schemeClr val="accent1"/>
-          </a:lnRef>
-          <a:fillRef idx="3">
-            <a:schemeClr val="accent1"/>
-          </a:fillRef>
-          <a:effectRef idx="2">
-            <a:schemeClr val="accent1"/>
-          </a:effectRef>
-          <a:fontRef idx="minor">
-            <a:schemeClr val="lt1"/>
-          </a:fontRef>
-        </p:style>
-        <p:txBody>
-          <a:bodyPr lIns="0" tIns="0" rIns="0" bIns="0" rtlCol="0" anchor="ctr"/>
-          <a:lstStyle/>
-          <a:p>
-            <a:pPr algn="ctr"/>
-            <a:r>
-              <a:rPr lang="en-US" sz="1000">
-                <a:solidFill>
-                  <a:schemeClr val="tx1"/>
-                </a:solidFill>
-                <a:latin typeface="Consolas"/>
-                <a:cs typeface="Consolas"/>
-              </a:rPr>
-              <a:t>81</a:t>
-            </a:r>
-          </a:p>
-        </p:txBody>
-      </p:sp>
-      <p:sp>
-        <p:nvSpPr>
           <p:cNvPr id="6" name="Rectangle 5"/>
           <p:cNvSpPr/>
           <p:nvPr/>
@@ -3325,6 +3271,102 @@
                 <a:cs typeface="Consolas"/>
               </a:rPr>
               <a:t>data</a:t>
+            </a:r>
+          </a:p>
+        </p:txBody>
+      </p:sp>
+      <p:sp>
+        <p:nvSpPr>
+          <p:cNvPr id="8" name="TextBox 7"/>
+          <p:cNvSpPr txBox="1"/>
+          <p:nvPr/>
+        </p:nvSpPr>
+        <p:spPr>
+          <a:xfrm>
+            <a:off x="1006615" y="1758310"/>
+            <a:ext cx="678216" cy="246221"/>
+          </a:xfrm>
+          <a:prstGeom prst="rect">
+            <a:avLst/>
+          </a:prstGeom>
+          <a:noFill/>
+        </p:spPr>
+        <p:txBody>
+          <a:bodyPr wrap="none" rtlCol="0">
+            <a:spAutoFit/>
+          </a:bodyPr>
+          <a:lstStyle/>
+          <a:p>
+            <a:r>
+              <a:rPr lang="en-US" sz="1000">
+                <a:latin typeface="Consolas"/>
+                <a:cs typeface="Consolas"/>
+              </a:rPr>
+              <a:t>2 bytes</a:t>
+            </a:r>
+          </a:p>
+        </p:txBody>
+      </p:sp>
+      <p:sp>
+        <p:nvSpPr>
+          <p:cNvPr id="10" name="TextBox 9"/>
+          <p:cNvSpPr txBox="1"/>
+          <p:nvPr/>
+        </p:nvSpPr>
+        <p:spPr>
+          <a:xfrm>
+            <a:off x="1622576" y="1758310"/>
+            <a:ext cx="678216" cy="246221"/>
+          </a:xfrm>
+          <a:prstGeom prst="rect">
+            <a:avLst/>
+          </a:prstGeom>
+          <a:noFill/>
+        </p:spPr>
+        <p:txBody>
+          <a:bodyPr wrap="none" rtlCol="0">
+            <a:spAutoFit/>
+          </a:bodyPr>
+          <a:lstStyle/>
+          <a:p>
+            <a:r>
+              <a:rPr lang="en-US" sz="1000">
+                <a:latin typeface="Consolas"/>
+                <a:cs typeface="Consolas"/>
+              </a:rPr>
+              <a:t>2 bytes</a:t>
+            </a:r>
+          </a:p>
+        </p:txBody>
+      </p:sp>
+      <p:sp>
+        <p:nvSpPr>
+          <p:cNvPr id="11" name="TextBox 10"/>
+          <p:cNvSpPr txBox="1"/>
+          <p:nvPr/>
+        </p:nvSpPr>
+        <p:spPr>
+          <a:xfrm>
+            <a:off x="2384967" y="1758310"/>
+            <a:ext cx="678216" cy="246221"/>
+          </a:xfrm>
+          <a:prstGeom prst="rect">
+            <a:avLst/>
+          </a:prstGeom>
+          <a:noFill/>
+        </p:spPr>
+        <p:txBody>
+          <a:bodyPr wrap="none" rtlCol="0">
+            <a:spAutoFit/>
+          </a:bodyPr>
+          <a:lstStyle/>
+          <a:p>
+            <a:r>
+              <a:rPr lang="en-US" sz="1000">
+                <a:latin typeface="Consolas"/>
+                <a:cs typeface="Consolas"/>
+              </a:rPr>
+              <a:t>2 bytes</a:t>
             </a:r>
           </a:p>
         </p:txBody>

</xml_diff>

<commit_message>
Simplifications and improvements to the protocol: - Removed unnecessary fields from the fragments - Added retry policy for fragments - Specified endianess on sequence and byte level - Enhanced example sequence diagram
</commit_message>
<xml_diff>
--- a/resources/figures.pptx
+++ b/resources/figures.pptx
@@ -5,16 +5,17 @@
     <p:sldMasterId id="2147483676" r:id="rId1"/>
   </p:sldMasterIdLst>
   <p:notesMasterIdLst>
-    <p:notesMasterId r:id="rId6"/>
+    <p:notesMasterId r:id="rId7"/>
   </p:notesMasterIdLst>
   <p:handoutMasterIdLst>
-    <p:handoutMasterId r:id="rId7"/>
+    <p:handoutMasterId r:id="rId8"/>
   </p:handoutMasterIdLst>
   <p:sldIdLst>
     <p:sldId id="256" r:id="rId2"/>
     <p:sldId id="278" r:id="rId3"/>
     <p:sldId id="279" r:id="rId4"/>
-    <p:sldId id="280" r:id="rId5"/>
+    <p:sldId id="281" r:id="rId5"/>
+    <p:sldId id="280" r:id="rId6"/>
   </p:sldIdLst>
   <p:sldSz cx="9144000" cy="6858000" type="screen4x3"/>
   <p:notesSz cx="6884988" cy="10018713"/>
@@ -461,7 +462,7 @@
               <a:pPr>
                 <a:defRPr/>
               </a:pPr>
-              <a:t>20/06/16</a:t>
+              <a:t>21/06/16</a:t>
             </a:fld>
             <a:endParaRPr lang="en-US" altLang="ja-JP"/>
           </a:p>
@@ -3385,6 +3386,651 @@
 </file>
 
 <file path=ppt/slides/slide4.xml><?xml version="1.0" encoding="utf-8"?>
+<p:sld xmlns:a="http://schemas.openxmlformats.org/drawingml/2006/main" xmlns:r="http://schemas.openxmlformats.org/officeDocument/2006/relationships" xmlns:p="http://schemas.openxmlformats.org/presentationml/2006/main">
+  <p:cSld>
+    <p:spTree>
+      <p:nvGrpSpPr>
+        <p:cNvPr id="1" name=""/>
+        <p:cNvGrpSpPr/>
+        <p:nvPr/>
+      </p:nvGrpSpPr>
+      <p:grpSpPr>
+        <a:xfrm>
+          <a:off x="0" y="0"/>
+          <a:ext cx="0" cy="0"/>
+          <a:chOff x="0" y="0"/>
+          <a:chExt cx="0" cy="0"/>
+        </a:xfrm>
+      </p:grpSpPr>
+      <p:sp>
+        <p:nvSpPr>
+          <p:cNvPr id="6" name="Rectangle 5"/>
+          <p:cNvSpPr/>
+          <p:nvPr/>
+        </p:nvSpPr>
+        <p:spPr>
+          <a:xfrm>
+            <a:off x="1000026" y="2002338"/>
+            <a:ext cx="652910" cy="390028"/>
+          </a:xfrm>
+          <a:prstGeom prst="rect">
+            <a:avLst/>
+          </a:prstGeom>
+          <a:noFill/>
+          <a:ln w="19050" cmpd="sng">
+            <a:solidFill>
+              <a:schemeClr val="tx1"/>
+            </a:solidFill>
+          </a:ln>
+          <a:effectLst/>
+        </p:spPr>
+        <p:style>
+          <a:lnRef idx="1">
+            <a:schemeClr val="accent1"/>
+          </a:lnRef>
+          <a:fillRef idx="3">
+            <a:schemeClr val="accent1"/>
+          </a:fillRef>
+          <a:effectRef idx="2">
+            <a:schemeClr val="accent1"/>
+          </a:effectRef>
+          <a:fontRef idx="minor">
+            <a:schemeClr val="lt1"/>
+          </a:fontRef>
+        </p:style>
+        <p:txBody>
+          <a:bodyPr lIns="0" tIns="0" rIns="0" bIns="0" rtlCol="0" anchor="ctr"/>
+          <a:lstStyle/>
+          <a:p>
+            <a:pPr algn="ctr"/>
+            <a:r>
+              <a:rPr lang="en-US" sz="1000">
+                <a:solidFill>
+                  <a:schemeClr val="tx1"/>
+                </a:solidFill>
+                <a:latin typeface="Consolas"/>
+                <a:cs typeface="Consolas"/>
+              </a:rPr>
+              <a:t>pkt_nbr</a:t>
+            </a:r>
+          </a:p>
+        </p:txBody>
+      </p:sp>
+      <p:sp>
+        <p:nvSpPr>
+          <p:cNvPr id="7" name="Rectangle 6"/>
+          <p:cNvSpPr/>
+          <p:nvPr/>
+        </p:nvSpPr>
+        <p:spPr>
+          <a:xfrm>
+            <a:off x="1652936" y="2002338"/>
+            <a:ext cx="707129" cy="390028"/>
+          </a:xfrm>
+          <a:prstGeom prst="rect">
+            <a:avLst/>
+          </a:prstGeom>
+          <a:noFill/>
+          <a:ln w="19050" cmpd="sng">
+            <a:solidFill>
+              <a:schemeClr val="tx1"/>
+            </a:solidFill>
+          </a:ln>
+          <a:effectLst/>
+        </p:spPr>
+        <p:style>
+          <a:lnRef idx="1">
+            <a:schemeClr val="accent1"/>
+          </a:lnRef>
+          <a:fillRef idx="3">
+            <a:schemeClr val="accent1"/>
+          </a:fillRef>
+          <a:effectRef idx="2">
+            <a:schemeClr val="accent1"/>
+          </a:effectRef>
+          <a:fontRef idx="minor">
+            <a:schemeClr val="lt1"/>
+          </a:fontRef>
+        </p:style>
+        <p:txBody>
+          <a:bodyPr lIns="0" tIns="0" rIns="0" bIns="0" rtlCol="0" anchor="ctr"/>
+          <a:lstStyle/>
+          <a:p>
+            <a:pPr algn="ctr"/>
+            <a:r>
+              <a:rPr lang="en-US" sz="1000">
+                <a:solidFill>
+                  <a:schemeClr val="tx1"/>
+                </a:solidFill>
+                <a:latin typeface="Consolas"/>
+                <a:cs typeface="Consolas"/>
+              </a:rPr>
+              <a:t>byte 0</a:t>
+            </a:r>
+            <a:endParaRPr lang="en-US" sz="1000">
+              <a:solidFill>
+                <a:schemeClr val="tx1"/>
+              </a:solidFill>
+              <a:latin typeface="Consolas"/>
+              <a:cs typeface="Consolas"/>
+            </a:endParaRPr>
+          </a:p>
+        </p:txBody>
+      </p:sp>
+      <p:sp>
+        <p:nvSpPr>
+          <p:cNvPr id="9" name="Rectangle 8"/>
+          <p:cNvSpPr/>
+          <p:nvPr/>
+        </p:nvSpPr>
+        <p:spPr>
+          <a:xfrm>
+            <a:off x="2360066" y="2002338"/>
+            <a:ext cx="700018" cy="390028"/>
+          </a:xfrm>
+          <a:prstGeom prst="rect">
+            <a:avLst/>
+          </a:prstGeom>
+          <a:noFill/>
+          <a:ln w="19050" cmpd="sng">
+            <a:solidFill>
+              <a:schemeClr val="tx1"/>
+            </a:solidFill>
+          </a:ln>
+          <a:effectLst/>
+        </p:spPr>
+        <p:style>
+          <a:lnRef idx="1">
+            <a:schemeClr val="accent1"/>
+          </a:lnRef>
+          <a:fillRef idx="3">
+            <a:schemeClr val="accent1"/>
+          </a:fillRef>
+          <a:effectRef idx="2">
+            <a:schemeClr val="accent1"/>
+          </a:effectRef>
+          <a:fontRef idx="minor">
+            <a:schemeClr val="lt1"/>
+          </a:fontRef>
+        </p:style>
+        <p:txBody>
+          <a:bodyPr lIns="0" tIns="0" rIns="0" bIns="0" rtlCol="0" anchor="ctr"/>
+          <a:lstStyle/>
+          <a:p>
+            <a:pPr algn="ctr"/>
+            <a:r>
+              <a:rPr lang="en-US" sz="1000">
+                <a:solidFill>
+                  <a:schemeClr val="tx1"/>
+                </a:solidFill>
+                <a:latin typeface="Consolas"/>
+                <a:cs typeface="Consolas"/>
+              </a:rPr>
+              <a:t>byte 1</a:t>
+            </a:r>
+          </a:p>
+        </p:txBody>
+      </p:sp>
+      <p:sp>
+        <p:nvSpPr>
+          <p:cNvPr id="8" name="TextBox 7"/>
+          <p:cNvSpPr txBox="1"/>
+          <p:nvPr/>
+        </p:nvSpPr>
+        <p:spPr>
+          <a:xfrm>
+            <a:off x="1006615" y="1758310"/>
+            <a:ext cx="607708" cy="246221"/>
+          </a:xfrm>
+          <a:prstGeom prst="rect">
+            <a:avLst/>
+          </a:prstGeom>
+          <a:noFill/>
+        </p:spPr>
+        <p:txBody>
+          <a:bodyPr wrap="none" rtlCol="0">
+            <a:spAutoFit/>
+          </a:bodyPr>
+          <a:lstStyle/>
+          <a:p>
+            <a:r>
+              <a:rPr lang="en-US" sz="1000">
+                <a:latin typeface="Consolas"/>
+                <a:cs typeface="Consolas"/>
+              </a:rPr>
+              <a:t>1 byte</a:t>
+            </a:r>
+          </a:p>
+        </p:txBody>
+      </p:sp>
+      <p:sp>
+        <p:nvSpPr>
+          <p:cNvPr id="13" name="Rectangle 12"/>
+          <p:cNvSpPr/>
+          <p:nvPr/>
+        </p:nvSpPr>
+        <p:spPr>
+          <a:xfrm>
+            <a:off x="3060084" y="2002338"/>
+            <a:ext cx="707129" cy="390028"/>
+          </a:xfrm>
+          <a:prstGeom prst="rect">
+            <a:avLst/>
+          </a:prstGeom>
+          <a:noFill/>
+          <a:ln w="19050" cmpd="sng">
+            <a:solidFill>
+              <a:schemeClr val="tx1"/>
+            </a:solidFill>
+          </a:ln>
+          <a:effectLst/>
+        </p:spPr>
+        <p:style>
+          <a:lnRef idx="1">
+            <a:schemeClr val="accent1"/>
+          </a:lnRef>
+          <a:fillRef idx="3">
+            <a:schemeClr val="accent1"/>
+          </a:fillRef>
+          <a:effectRef idx="2">
+            <a:schemeClr val="accent1"/>
+          </a:effectRef>
+          <a:fontRef idx="minor">
+            <a:schemeClr val="lt1"/>
+          </a:fontRef>
+        </p:style>
+        <p:txBody>
+          <a:bodyPr lIns="0" tIns="0" rIns="0" bIns="0" rtlCol="0" anchor="ctr"/>
+          <a:lstStyle/>
+          <a:p>
+            <a:pPr algn="ctr"/>
+            <a:r>
+              <a:rPr lang="en-US" sz="1000">
+                <a:solidFill>
+                  <a:schemeClr val="tx1"/>
+                </a:solidFill>
+                <a:latin typeface="Consolas"/>
+                <a:cs typeface="Consolas"/>
+              </a:rPr>
+              <a:t>byte 2</a:t>
+            </a:r>
+            <a:endParaRPr lang="en-US" sz="1000">
+              <a:solidFill>
+                <a:schemeClr val="tx1"/>
+              </a:solidFill>
+              <a:latin typeface="Consolas"/>
+              <a:cs typeface="Consolas"/>
+            </a:endParaRPr>
+          </a:p>
+        </p:txBody>
+      </p:sp>
+      <p:sp>
+        <p:nvSpPr>
+          <p:cNvPr id="14" name="Rectangle 13"/>
+          <p:cNvSpPr/>
+          <p:nvPr/>
+        </p:nvSpPr>
+        <p:spPr>
+          <a:xfrm>
+            <a:off x="4357230" y="2002338"/>
+            <a:ext cx="700018" cy="390028"/>
+          </a:xfrm>
+          <a:prstGeom prst="rect">
+            <a:avLst/>
+          </a:prstGeom>
+          <a:noFill/>
+          <a:ln w="19050" cmpd="sng">
+            <a:solidFill>
+              <a:schemeClr val="tx1"/>
+            </a:solidFill>
+          </a:ln>
+          <a:effectLst/>
+        </p:spPr>
+        <p:style>
+          <a:lnRef idx="1">
+            <a:schemeClr val="accent1"/>
+          </a:lnRef>
+          <a:fillRef idx="3">
+            <a:schemeClr val="accent1"/>
+          </a:fillRef>
+          <a:effectRef idx="2">
+            <a:schemeClr val="accent1"/>
+          </a:effectRef>
+          <a:fontRef idx="minor">
+            <a:schemeClr val="lt1"/>
+          </a:fontRef>
+        </p:style>
+        <p:txBody>
+          <a:bodyPr lIns="0" tIns="0" rIns="0" bIns="0" rtlCol="0" anchor="ctr"/>
+          <a:lstStyle/>
+          <a:p>
+            <a:pPr algn="ctr"/>
+            <a:r>
+              <a:rPr lang="en-US" sz="1000">
+                <a:solidFill>
+                  <a:schemeClr val="tx1"/>
+                </a:solidFill>
+                <a:latin typeface="Consolas"/>
+                <a:cs typeface="Consolas"/>
+              </a:rPr>
+              <a:t>byte n</a:t>
+            </a:r>
+          </a:p>
+        </p:txBody>
+      </p:sp>
+      <p:sp>
+        <p:nvSpPr>
+          <p:cNvPr id="15" name="TextBox 14"/>
+          <p:cNvSpPr txBox="1"/>
+          <p:nvPr/>
+        </p:nvSpPr>
+        <p:spPr>
+          <a:xfrm>
+            <a:off x="3911893" y="2074242"/>
+            <a:ext cx="396187" cy="246221"/>
+          </a:xfrm>
+          <a:prstGeom prst="rect">
+            <a:avLst/>
+          </a:prstGeom>
+          <a:noFill/>
+        </p:spPr>
+        <p:txBody>
+          <a:bodyPr wrap="none" rtlCol="0">
+            <a:spAutoFit/>
+          </a:bodyPr>
+          <a:lstStyle/>
+          <a:p>
+            <a:r>
+              <a:rPr lang="en-US" sz="1000">
+                <a:latin typeface="Consolas"/>
+                <a:cs typeface="Consolas"/>
+              </a:rPr>
+              <a:t>···</a:t>
+            </a:r>
+          </a:p>
+        </p:txBody>
+      </p:sp>
+      <p:sp>
+        <p:nvSpPr>
+          <p:cNvPr id="2" name="Left Brace 1"/>
+          <p:cNvSpPr/>
+          <p:nvPr/>
+        </p:nvSpPr>
+        <p:spPr bwMode="auto">
+          <a:xfrm rot="5400000">
+            <a:off x="3241721" y="106159"/>
+            <a:ext cx="226742" cy="3404312"/>
+          </a:xfrm>
+          <a:prstGeom prst="leftBrace">
+            <a:avLst>
+              <a:gd name="adj1" fmla="val 38334"/>
+              <a:gd name="adj2" fmla="val 50000"/>
+            </a:avLst>
+          </a:prstGeom>
+          <a:noFill/>
+          <a:ln w="12700" cap="flat" cmpd="sng" algn="ctr">
+            <a:solidFill>
+              <a:schemeClr val="tx1">
+                <a:lumMod val="50000"/>
+              </a:schemeClr>
+            </a:solidFill>
+            <a:prstDash val="solid"/>
+            <a:round/>
+            <a:headEnd type="none" w="med" len="med"/>
+            <a:tailEnd type="none" w="med" len="med"/>
+          </a:ln>
+          <a:effectLst/>
+        </p:spPr>
+        <p:txBody>
+          <a:bodyPr vert="horz" wrap="none" lIns="72000" tIns="45720" rIns="72000" bIns="45720" numCol="1" rtlCol="0" anchor="t" anchorCtr="0" compatLnSpc="1">
+            <a:prstTxWarp prst="textNoShape">
+              <a:avLst/>
+            </a:prstTxWarp>
+          </a:bodyPr>
+          <a:lstStyle/>
+          <a:p>
+            <a:pPr marL="0" marR="0" indent="0" algn="l" defTabSz="914400" rtl="0" eaLnBrk="1" fontAlgn="base" latinLnBrk="0" hangingPunct="1">
+              <a:lnSpc>
+                <a:spcPct val="100000"/>
+              </a:lnSpc>
+              <a:spcBef>
+                <a:spcPct val="50000"/>
+              </a:spcBef>
+              <a:spcAft>
+                <a:spcPct val="0"/>
+              </a:spcAft>
+              <a:buClrTx/>
+              <a:buSzTx/>
+              <a:buFontTx/>
+              <a:buNone/>
+              <a:tabLst/>
+            </a:pPr>
+            <a:endParaRPr kumimoji="0" lang="en-US" sz="2000" b="0" i="0" u="none" strike="noStrike" cap="none" normalizeH="0" baseline="0" smtClean="0">
+              <a:ln>
+                <a:noFill/>
+              </a:ln>
+              <a:solidFill>
+                <a:schemeClr val="tx1"/>
+              </a:solidFill>
+              <a:effectLst/>
+              <a:latin typeface="Arial" charset="0"/>
+            </a:endParaRPr>
+          </a:p>
+        </p:txBody>
+      </p:sp>
+      <p:sp>
+        <p:nvSpPr>
+          <p:cNvPr id="16" name="TextBox 15"/>
+          <p:cNvSpPr txBox="1"/>
+          <p:nvPr/>
+        </p:nvSpPr>
+        <p:spPr>
+          <a:xfrm>
+            <a:off x="3124363" y="1449294"/>
+            <a:ext cx="466694" cy="246221"/>
+          </a:xfrm>
+          <a:prstGeom prst="rect">
+            <a:avLst/>
+          </a:prstGeom>
+          <a:noFill/>
+        </p:spPr>
+        <p:txBody>
+          <a:bodyPr wrap="none" rtlCol="0">
+            <a:spAutoFit/>
+          </a:bodyPr>
+          <a:lstStyle/>
+          <a:p>
+            <a:r>
+              <a:rPr lang="en-US" sz="1000">
+                <a:latin typeface="Consolas"/>
+                <a:cs typeface="Consolas"/>
+              </a:rPr>
+              <a:t>data</a:t>
+            </a:r>
+          </a:p>
+        </p:txBody>
+      </p:sp>
+      <p:sp>
+        <p:nvSpPr>
+          <p:cNvPr id="17" name="TextBox 16"/>
+          <p:cNvSpPr txBox="1"/>
+          <p:nvPr/>
+        </p:nvSpPr>
+        <p:spPr>
+          <a:xfrm>
+            <a:off x="730022" y="1103066"/>
+            <a:ext cx="1453793" cy="246221"/>
+          </a:xfrm>
+          <a:prstGeom prst="rect">
+            <a:avLst/>
+          </a:prstGeom>
+          <a:noFill/>
+        </p:spPr>
+        <p:txBody>
+          <a:bodyPr wrap="none" rtlCol="0">
+            <a:spAutoFit/>
+          </a:bodyPr>
+          <a:lstStyle/>
+          <a:p>
+            <a:r>
+              <a:rPr lang="en-US" sz="1000">
+                <a:latin typeface="Consolas"/>
+                <a:cs typeface="Consolas"/>
+              </a:rPr>
+              <a:t>Transmission order</a:t>
+            </a:r>
+          </a:p>
+        </p:txBody>
+      </p:sp>
+      <p:sp>
+        <p:nvSpPr>
+          <p:cNvPr id="3" name="Left Arrow 2"/>
+          <p:cNvSpPr/>
+          <p:nvPr/>
+        </p:nvSpPr>
+        <p:spPr>
+          <a:xfrm>
+            <a:off x="827283" y="1349287"/>
+            <a:ext cx="1800049" cy="200014"/>
+          </a:xfrm>
+          <a:prstGeom prst="leftArrow">
+            <a:avLst/>
+          </a:prstGeom>
+          <a:noFill/>
+          <a:ln w="19050" cmpd="sng">
+            <a:solidFill>
+              <a:schemeClr val="tx1"/>
+            </a:solidFill>
+          </a:ln>
+          <a:effectLst/>
+        </p:spPr>
+        <p:style>
+          <a:lnRef idx="1">
+            <a:schemeClr val="accent1"/>
+          </a:lnRef>
+          <a:fillRef idx="3">
+            <a:schemeClr val="accent1"/>
+          </a:fillRef>
+          <a:effectRef idx="2">
+            <a:schemeClr val="accent1"/>
+          </a:effectRef>
+          <a:fontRef idx="minor">
+            <a:schemeClr val="lt1"/>
+          </a:fontRef>
+        </p:style>
+        <p:txBody>
+          <a:bodyPr rtlCol="0" anchor="ctr"/>
+          <a:lstStyle/>
+          <a:p>
+            <a:pPr algn="ctr"/>
+            <a:endParaRPr lang="en-US" sz="1400">
+              <a:solidFill>
+                <a:schemeClr val="tx1"/>
+              </a:solidFill>
+            </a:endParaRPr>
+          </a:p>
+        </p:txBody>
+      </p:sp>
+      <p:sp>
+        <p:nvSpPr>
+          <p:cNvPr id="18" name="Rectangle 17"/>
+          <p:cNvSpPr/>
+          <p:nvPr/>
+        </p:nvSpPr>
+        <p:spPr>
+          <a:xfrm>
+            <a:off x="1006614" y="2906370"/>
+            <a:ext cx="1253447" cy="390028"/>
+          </a:xfrm>
+          <a:prstGeom prst="rect">
+            <a:avLst/>
+          </a:prstGeom>
+          <a:noFill/>
+          <a:ln w="19050" cmpd="sng">
+            <a:solidFill>
+              <a:schemeClr val="tx1"/>
+            </a:solidFill>
+          </a:ln>
+          <a:effectLst/>
+        </p:spPr>
+        <p:style>
+          <a:lnRef idx="1">
+            <a:schemeClr val="accent1"/>
+          </a:lnRef>
+          <a:fillRef idx="3">
+            <a:schemeClr val="accent1"/>
+          </a:fillRef>
+          <a:effectRef idx="2">
+            <a:schemeClr val="accent1"/>
+          </a:effectRef>
+          <a:fontRef idx="minor">
+            <a:schemeClr val="lt1"/>
+          </a:fontRef>
+        </p:style>
+        <p:txBody>
+          <a:bodyPr lIns="0" tIns="0" rIns="0" bIns="0" rtlCol="0" anchor="ctr"/>
+          <a:lstStyle/>
+          <a:p>
+            <a:pPr algn="ctr"/>
+            <a:r>
+              <a:rPr lang="en-US" sz="1000">
+                <a:solidFill>
+                  <a:schemeClr val="tx1"/>
+                </a:solidFill>
+                <a:latin typeface="Consolas"/>
+                <a:cs typeface="Consolas"/>
+              </a:rPr>
+              <a:t>b8 b7 ··· b1 b0</a:t>
+            </a:r>
+          </a:p>
+        </p:txBody>
+      </p:sp>
+      <p:sp>
+        <p:nvSpPr>
+          <p:cNvPr id="19" name="TextBox 18"/>
+          <p:cNvSpPr txBox="1"/>
+          <p:nvPr/>
+        </p:nvSpPr>
+        <p:spPr>
+          <a:xfrm>
+            <a:off x="912917" y="2665569"/>
+            <a:ext cx="1735822" cy="246221"/>
+          </a:xfrm>
+          <a:prstGeom prst="rect">
+            <a:avLst/>
+          </a:prstGeom>
+          <a:noFill/>
+        </p:spPr>
+        <p:txBody>
+          <a:bodyPr wrap="none" rtlCol="0">
+            <a:spAutoFit/>
+          </a:bodyPr>
+          <a:lstStyle/>
+          <a:p>
+            <a:r>
+              <a:rPr lang="en-US" sz="1000">
+                <a:latin typeface="Consolas"/>
+                <a:cs typeface="Consolas"/>
+              </a:rPr>
+              <a:t>Bit ordering in a byte</a:t>
+            </a:r>
+          </a:p>
+        </p:txBody>
+      </p:sp>
+    </p:spTree>
+    <p:extLst>
+      <p:ext uri="{BB962C8B-B14F-4D97-AF65-F5344CB8AC3E}">
+        <p14:creationId xmlns:p14="http://schemas.microsoft.com/office/powerpoint/2010/main" val="2973955845"/>
+      </p:ext>
+    </p:extLst>
+  </p:cSld>
+  <p:clrMapOvr>
+    <a:masterClrMapping/>
+  </p:clrMapOvr>
+</p:sld>
+</file>
+
+<file path=ppt/slides/slide5.xml><?xml version="1.0" encoding="utf-8"?>
 <p:sld xmlns:a="http://schemas.openxmlformats.org/drawingml/2006/main" xmlns:r="http://schemas.openxmlformats.org/officeDocument/2006/relationships" xmlns:p="http://schemas.openxmlformats.org/presentationml/2006/main">
   <p:cSld>
     <p:spTree>

</xml_diff>

<commit_message>
Fixed wrong figure naming
</commit_message>
<xml_diff>
--- a/resources/figures.pptx
+++ b/resources/figures.pptx
@@ -5,17 +5,16 @@
     <p:sldMasterId id="2147483676" r:id="rId1"/>
   </p:sldMasterIdLst>
   <p:notesMasterIdLst>
-    <p:notesMasterId r:id="rId7"/>
+    <p:notesMasterId r:id="rId6"/>
   </p:notesMasterIdLst>
   <p:handoutMasterIdLst>
-    <p:handoutMasterId r:id="rId8"/>
+    <p:handoutMasterId r:id="rId7"/>
   </p:handoutMasterIdLst>
   <p:sldIdLst>
     <p:sldId id="256" r:id="rId2"/>
     <p:sldId id="278" r:id="rId3"/>
     <p:sldId id="279" r:id="rId4"/>
     <p:sldId id="281" r:id="rId5"/>
-    <p:sldId id="280" r:id="rId6"/>
   </p:sldIdLst>
   <p:sldSz cx="9144000" cy="6858000" type="screen4x3"/>
   <p:notesSz cx="6884988" cy="10018713"/>
@@ -3507,13 +3506,6 @@
               </a:rPr>
               <a:t>byte 0</a:t>
             </a:r>
-            <a:endParaRPr lang="en-US" sz="1000">
-              <a:solidFill>
-                <a:schemeClr val="tx1"/>
-              </a:solidFill>
-              <a:latin typeface="Consolas"/>
-              <a:cs typeface="Consolas"/>
-            </a:endParaRPr>
           </a:p>
         </p:txBody>
       </p:sp>
@@ -3654,13 +3646,6 @@
               </a:rPr>
               <a:t>byte 2</a:t>
             </a:r>
-            <a:endParaRPr lang="en-US" sz="1000">
-              <a:solidFill>
-                <a:schemeClr val="tx1"/>
-              </a:solidFill>
-              <a:latin typeface="Consolas"/>
-              <a:cs typeface="Consolas"/>
-            </a:endParaRPr>
           </a:p>
         </p:txBody>
       </p:sp>
@@ -4021,1031 +4006,6 @@
     <p:extLst>
       <p:ext uri="{BB962C8B-B14F-4D97-AF65-F5344CB8AC3E}">
         <p14:creationId xmlns:p14="http://schemas.microsoft.com/office/powerpoint/2010/main" val="2973955845"/>
-      </p:ext>
-    </p:extLst>
-  </p:cSld>
-  <p:clrMapOvr>
-    <a:masterClrMapping/>
-  </p:clrMapOvr>
-</p:sld>
-</file>
-
-<file path=ppt/slides/slide5.xml><?xml version="1.0" encoding="utf-8"?>
-<p:sld xmlns:a="http://schemas.openxmlformats.org/drawingml/2006/main" xmlns:r="http://schemas.openxmlformats.org/officeDocument/2006/relationships" xmlns:p="http://schemas.openxmlformats.org/presentationml/2006/main">
-  <p:cSld>
-    <p:spTree>
-      <p:nvGrpSpPr>
-        <p:cNvPr id="1" name=""/>
-        <p:cNvGrpSpPr/>
-        <p:nvPr/>
-      </p:nvGrpSpPr>
-      <p:grpSpPr>
-        <a:xfrm>
-          <a:off x="0" y="0"/>
-          <a:ext cx="0" cy="0"/>
-          <a:chOff x="0" y="0"/>
-          <a:chExt cx="0" cy="0"/>
-        </a:xfrm>
-      </p:grpSpPr>
-      <p:sp>
-        <p:nvSpPr>
-          <p:cNvPr id="2" name="Rectangle 1"/>
-          <p:cNvSpPr/>
-          <p:nvPr/>
-        </p:nvSpPr>
-        <p:spPr>
-          <a:xfrm>
-            <a:off x="1457500" y="800058"/>
-            <a:ext cx="905105" cy="490036"/>
-          </a:xfrm>
-          <a:prstGeom prst="rect">
-            <a:avLst/>
-          </a:prstGeom>
-          <a:noFill/>
-          <a:ln w="19050" cmpd="sng">
-            <a:solidFill>
-              <a:schemeClr val="tx1"/>
-            </a:solidFill>
-          </a:ln>
-          <a:effectLst/>
-        </p:spPr>
-        <p:style>
-          <a:lnRef idx="1">
-            <a:schemeClr val="accent1"/>
-          </a:lnRef>
-          <a:fillRef idx="3">
-            <a:schemeClr val="accent1"/>
-          </a:fillRef>
-          <a:effectRef idx="2">
-            <a:schemeClr val="accent1"/>
-          </a:effectRef>
-          <a:fontRef idx="minor">
-            <a:schemeClr val="lt1"/>
-          </a:fontRef>
-        </p:style>
-        <p:txBody>
-          <a:bodyPr rot="0" spcFirstLastPara="0" vertOverflow="overflow" horzOverflow="overflow" vert="horz" wrap="square" lIns="0" tIns="0" rIns="0" bIns="0" numCol="1" spcCol="0" rtlCol="0" fromWordArt="0" anchor="ctr" anchorCtr="0" forceAA="0" compatLnSpc="1">
-            <a:prstTxWarp prst="textNoShape">
-              <a:avLst/>
-            </a:prstTxWarp>
-            <a:noAutofit/>
-          </a:bodyPr>
-          <a:lstStyle/>
-          <a:p>
-            <a:pPr algn="ctr"/>
-            <a:r>
-              <a:rPr lang="en-US" sz="1000">
-                <a:solidFill>
-                  <a:schemeClr val="tx1"/>
-                </a:solidFill>
-                <a:latin typeface="Consolas"/>
-                <a:cs typeface="Consolas"/>
-              </a:rPr>
-              <a:t>Client (smartphone app)</a:t>
-            </a:r>
-          </a:p>
-        </p:txBody>
-      </p:sp>
-      <p:sp>
-        <p:nvSpPr>
-          <p:cNvPr id="3" name="Rectangle 2"/>
-          <p:cNvSpPr/>
-          <p:nvPr/>
-        </p:nvSpPr>
-        <p:spPr>
-          <a:xfrm>
-            <a:off x="6130023" y="800058"/>
-            <a:ext cx="905105" cy="490036"/>
-          </a:xfrm>
-          <a:prstGeom prst="rect">
-            <a:avLst/>
-          </a:prstGeom>
-          <a:noFill/>
-          <a:ln w="19050" cmpd="sng">
-            <a:solidFill>
-              <a:schemeClr val="tx1"/>
-            </a:solidFill>
-          </a:ln>
-          <a:effectLst/>
-        </p:spPr>
-        <p:style>
-          <a:lnRef idx="1">
-            <a:schemeClr val="accent1"/>
-          </a:lnRef>
-          <a:fillRef idx="3">
-            <a:schemeClr val="accent1"/>
-          </a:fillRef>
-          <a:effectRef idx="2">
-            <a:schemeClr val="accent1"/>
-          </a:effectRef>
-          <a:fontRef idx="minor">
-            <a:schemeClr val="lt1"/>
-          </a:fontRef>
-        </p:style>
-        <p:txBody>
-          <a:bodyPr rot="0" spcFirstLastPara="0" vertOverflow="overflow" horzOverflow="overflow" vert="horz" wrap="square" lIns="0" tIns="0" rIns="0" bIns="0" numCol="1" spcCol="0" rtlCol="0" fromWordArt="0" anchor="ctr" anchorCtr="0" forceAA="0" compatLnSpc="1">
-            <a:prstTxWarp prst="textNoShape">
-              <a:avLst/>
-            </a:prstTxWarp>
-            <a:noAutofit/>
-          </a:bodyPr>
-          <a:lstStyle/>
-          <a:p>
-            <a:pPr algn="ctr"/>
-            <a:r>
-              <a:rPr lang="en-US" sz="1000">
-                <a:solidFill>
-                  <a:schemeClr val="tx1"/>
-                </a:solidFill>
-                <a:latin typeface="Consolas"/>
-                <a:cs typeface="Consolas"/>
-              </a:rPr>
-              <a:t>Server </a:t>
-            </a:r>
-            <a:br>
-              <a:rPr lang="en-US" sz="1000">
-                <a:solidFill>
-                  <a:schemeClr val="tx1"/>
-                </a:solidFill>
-                <a:latin typeface="Consolas"/>
-                <a:cs typeface="Consolas"/>
-              </a:rPr>
-            </a:br>
-            <a:r>
-              <a:rPr lang="en-US" sz="1000">
-                <a:solidFill>
-                  <a:schemeClr val="tx1"/>
-                </a:solidFill>
-                <a:latin typeface="Consolas"/>
-                <a:cs typeface="Consolas"/>
-              </a:rPr>
-              <a:t>(BLE+SE device)</a:t>
-            </a:r>
-          </a:p>
-        </p:txBody>
-      </p:sp>
-      <p:cxnSp>
-        <p:nvCxnSpPr>
-          <p:cNvPr id="5" name="Straight Connector 4"/>
-          <p:cNvCxnSpPr>
-            <a:stCxn id="2" idx="2"/>
-          </p:cNvCxnSpPr>
-          <p:nvPr/>
-        </p:nvCxnSpPr>
-        <p:spPr bwMode="auto">
-          <a:xfrm>
-            <a:off x="1910053" y="1290094"/>
-            <a:ext cx="9999" cy="5150376"/>
-          </a:xfrm>
-          <a:prstGeom prst="line">
-            <a:avLst/>
-          </a:prstGeom>
-          <a:solidFill>
-            <a:schemeClr val="accent1"/>
-          </a:solidFill>
-          <a:ln w="12700" cap="flat" cmpd="sng" algn="ctr">
-            <a:solidFill>
-              <a:schemeClr val="tx1"/>
-            </a:solidFill>
-            <a:prstDash val="dash"/>
-            <a:round/>
-            <a:headEnd type="none" w="med" len="med"/>
-            <a:tailEnd type="none" w="med" len="med"/>
-          </a:ln>
-          <a:effectLst/>
-        </p:spPr>
-      </p:cxnSp>
-      <p:cxnSp>
-        <p:nvCxnSpPr>
-          <p:cNvPr id="6" name="Straight Connector 5"/>
-          <p:cNvCxnSpPr/>
-          <p:nvPr/>
-        </p:nvCxnSpPr>
-        <p:spPr bwMode="auto">
-          <a:xfrm>
-            <a:off x="6582575" y="1290094"/>
-            <a:ext cx="9999" cy="5150376"/>
-          </a:xfrm>
-          <a:prstGeom prst="line">
-            <a:avLst/>
-          </a:prstGeom>
-          <a:solidFill>
-            <a:schemeClr val="accent1"/>
-          </a:solidFill>
-          <a:ln w="12700" cap="flat" cmpd="sng" algn="ctr">
-            <a:solidFill>
-              <a:schemeClr val="tx1"/>
-            </a:solidFill>
-            <a:prstDash val="dash"/>
-            <a:round/>
-            <a:headEnd type="none" w="med" len="med"/>
-            <a:tailEnd type="none" w="med" len="med"/>
-          </a:ln>
-          <a:effectLst/>
-        </p:spPr>
-      </p:cxnSp>
-      <p:cxnSp>
-        <p:nvCxnSpPr>
-          <p:cNvPr id="8" name="Straight Arrow Connector 7"/>
-          <p:cNvCxnSpPr/>
-          <p:nvPr/>
-        </p:nvCxnSpPr>
-        <p:spPr bwMode="auto">
-          <a:xfrm flipH="1">
-            <a:off x="1910053" y="1618530"/>
-            <a:ext cx="4672522" cy="0"/>
-          </a:xfrm>
-          <a:prstGeom prst="straightConnector1">
-            <a:avLst/>
-          </a:prstGeom>
-          <a:solidFill>
-            <a:schemeClr val="accent1"/>
-          </a:solidFill>
-          <a:ln w="12700" cap="flat" cmpd="sng" algn="ctr">
-            <a:solidFill>
-              <a:schemeClr val="tx1"/>
-            </a:solidFill>
-            <a:prstDash val="solid"/>
-            <a:round/>
-            <a:headEnd type="none" w="med" len="med"/>
-            <a:tailEnd type="arrow"/>
-          </a:ln>
-          <a:effectLst/>
-        </p:spPr>
-      </p:cxnSp>
-      <p:sp>
-        <p:nvSpPr>
-          <p:cNvPr id="9" name="TextBox 8"/>
-          <p:cNvSpPr txBox="1"/>
-          <p:nvPr/>
-        </p:nvSpPr>
-        <p:spPr>
-          <a:xfrm>
-            <a:off x="4274740" y="1372309"/>
-            <a:ext cx="1947343" cy="246221"/>
-          </a:xfrm>
-          <a:prstGeom prst="rect">
-            <a:avLst/>
-          </a:prstGeom>
-          <a:noFill/>
-        </p:spPr>
-        <p:txBody>
-          <a:bodyPr wrap="none" rtlCol="0">
-            <a:spAutoFit/>
-          </a:bodyPr>
-          <a:lstStyle/>
-          <a:p>
-            <a:r>
-              <a:rPr lang="en-US" sz="1000">
-                <a:latin typeface="Consolas"/>
-                <a:cs typeface="Consolas"/>
-              </a:rPr>
-              <a:t>Server broadcasts service</a:t>
-            </a:r>
-          </a:p>
-        </p:txBody>
-      </p:sp>
-      <p:cxnSp>
-        <p:nvCxnSpPr>
-          <p:cNvPr id="11" name="Straight Arrow Connector 10"/>
-          <p:cNvCxnSpPr/>
-          <p:nvPr/>
-        </p:nvCxnSpPr>
-        <p:spPr bwMode="auto">
-          <a:xfrm>
-            <a:off x="1910053" y="1933935"/>
-            <a:ext cx="4672522" cy="0"/>
-          </a:xfrm>
-          <a:prstGeom prst="straightConnector1">
-            <a:avLst/>
-          </a:prstGeom>
-          <a:solidFill>
-            <a:schemeClr val="accent1"/>
-          </a:solidFill>
-          <a:ln w="12700" cap="flat" cmpd="sng" algn="ctr">
-            <a:solidFill>
-              <a:schemeClr val="tx1"/>
-            </a:solidFill>
-            <a:prstDash val="solid"/>
-            <a:round/>
-            <a:headEnd type="none" w="med" len="med"/>
-            <a:tailEnd type="arrow"/>
-          </a:ln>
-          <a:effectLst/>
-        </p:spPr>
-      </p:cxnSp>
-      <p:sp>
-        <p:nvSpPr>
-          <p:cNvPr id="12" name="TextBox 11"/>
-          <p:cNvSpPr txBox="1"/>
-          <p:nvPr/>
-        </p:nvSpPr>
-        <p:spPr>
-          <a:xfrm>
-            <a:off x="2362605" y="1720914"/>
-            <a:ext cx="678216" cy="246221"/>
-          </a:xfrm>
-          <a:prstGeom prst="rect">
-            <a:avLst/>
-          </a:prstGeom>
-          <a:noFill/>
-        </p:spPr>
-        <p:txBody>
-          <a:bodyPr wrap="none" rtlCol="0">
-            <a:spAutoFit/>
-          </a:bodyPr>
-          <a:lstStyle/>
-          <a:p>
-            <a:r>
-              <a:rPr lang="en-US" sz="1000">
-                <a:latin typeface="Consolas"/>
-                <a:cs typeface="Consolas"/>
-              </a:rPr>
-              <a:t>Connect</a:t>
-            </a:r>
-          </a:p>
-        </p:txBody>
-      </p:sp>
-      <p:cxnSp>
-        <p:nvCxnSpPr>
-          <p:cNvPr id="13" name="Straight Arrow Connector 12"/>
-          <p:cNvCxnSpPr/>
-          <p:nvPr/>
-        </p:nvCxnSpPr>
-        <p:spPr bwMode="auto">
-          <a:xfrm flipH="1">
-            <a:off x="1910053" y="2144436"/>
-            <a:ext cx="4672522" cy="0"/>
-          </a:xfrm>
-          <a:prstGeom prst="straightConnector1">
-            <a:avLst/>
-          </a:prstGeom>
-          <a:solidFill>
-            <a:schemeClr val="accent1"/>
-          </a:solidFill>
-          <a:ln w="12700" cap="flat" cmpd="sng" algn="ctr">
-            <a:solidFill>
-              <a:schemeClr val="tx1"/>
-            </a:solidFill>
-            <a:prstDash val="solid"/>
-            <a:round/>
-            <a:headEnd type="none" w="med" len="med"/>
-            <a:tailEnd type="arrow"/>
-          </a:ln>
-          <a:effectLst/>
-        </p:spPr>
-      </p:cxnSp>
-      <p:sp>
-        <p:nvSpPr>
-          <p:cNvPr id="14" name="TextBox 13"/>
-          <p:cNvSpPr txBox="1"/>
-          <p:nvPr/>
-        </p:nvSpPr>
-        <p:spPr>
-          <a:xfrm>
-            <a:off x="4274739" y="1931415"/>
-            <a:ext cx="1947343" cy="246221"/>
-          </a:xfrm>
-          <a:prstGeom prst="rect">
-            <a:avLst/>
-          </a:prstGeom>
-          <a:noFill/>
-        </p:spPr>
-        <p:txBody>
-          <a:bodyPr wrap="square" rtlCol="0">
-            <a:spAutoFit/>
-          </a:bodyPr>
-          <a:lstStyle/>
-          <a:p>
-            <a:pPr algn="r"/>
-            <a:r>
-              <a:rPr lang="en-US" sz="1000">
-                <a:latin typeface="Consolas"/>
-                <a:cs typeface="Consolas"/>
-              </a:rPr>
-              <a:t>OK</a:t>
-            </a:r>
-          </a:p>
-        </p:txBody>
-      </p:sp>
-      <p:cxnSp>
-        <p:nvCxnSpPr>
-          <p:cNvPr id="18" name="Straight Arrow Connector 17"/>
-          <p:cNvCxnSpPr/>
-          <p:nvPr/>
-        </p:nvCxnSpPr>
-        <p:spPr bwMode="auto">
-          <a:xfrm>
-            <a:off x="1910053" y="2404951"/>
-            <a:ext cx="4672522" cy="0"/>
-          </a:xfrm>
-          <a:prstGeom prst="straightConnector1">
-            <a:avLst/>
-          </a:prstGeom>
-          <a:solidFill>
-            <a:schemeClr val="accent1"/>
-          </a:solidFill>
-          <a:ln w="12700" cap="flat" cmpd="sng" algn="ctr">
-            <a:solidFill>
-              <a:schemeClr val="tx1"/>
-            </a:solidFill>
-            <a:prstDash val="solid"/>
-            <a:round/>
-            <a:headEnd type="none" w="med" len="med"/>
-            <a:tailEnd type="arrow"/>
-          </a:ln>
-          <a:effectLst/>
-        </p:spPr>
-      </p:cxnSp>
-      <p:sp>
-        <p:nvSpPr>
-          <p:cNvPr id="19" name="TextBox 18"/>
-          <p:cNvSpPr txBox="1"/>
-          <p:nvPr/>
-        </p:nvSpPr>
-        <p:spPr>
-          <a:xfrm>
-            <a:off x="2362605" y="2191930"/>
-            <a:ext cx="466694" cy="246221"/>
-          </a:xfrm>
-          <a:prstGeom prst="rect">
-            <a:avLst/>
-          </a:prstGeom>
-          <a:noFill/>
-        </p:spPr>
-        <p:txBody>
-          <a:bodyPr wrap="none" rtlCol="0">
-            <a:spAutoFit/>
-          </a:bodyPr>
-          <a:lstStyle/>
-          <a:p>
-            <a:r>
-              <a:rPr lang="en-US" sz="1000">
-                <a:latin typeface="Consolas"/>
-                <a:cs typeface="Consolas"/>
-              </a:rPr>
-              <a:t>Bond</a:t>
-            </a:r>
-          </a:p>
-        </p:txBody>
-      </p:sp>
-      <p:cxnSp>
-        <p:nvCxnSpPr>
-          <p:cNvPr id="20" name="Straight Arrow Connector 19"/>
-          <p:cNvCxnSpPr/>
-          <p:nvPr/>
-        </p:nvCxnSpPr>
-        <p:spPr bwMode="auto">
-          <a:xfrm flipH="1">
-            <a:off x="1910053" y="2615452"/>
-            <a:ext cx="4672522" cy="0"/>
-          </a:xfrm>
-          <a:prstGeom prst="straightConnector1">
-            <a:avLst/>
-          </a:prstGeom>
-          <a:solidFill>
-            <a:schemeClr val="accent1"/>
-          </a:solidFill>
-          <a:ln w="12700" cap="flat" cmpd="sng" algn="ctr">
-            <a:solidFill>
-              <a:schemeClr val="tx1"/>
-            </a:solidFill>
-            <a:prstDash val="solid"/>
-            <a:round/>
-            <a:headEnd type="none" w="med" len="med"/>
-            <a:tailEnd type="arrow"/>
-          </a:ln>
-          <a:effectLst/>
-        </p:spPr>
-      </p:cxnSp>
-      <p:sp>
-        <p:nvSpPr>
-          <p:cNvPr id="21" name="TextBox 20"/>
-          <p:cNvSpPr txBox="1"/>
-          <p:nvPr/>
-        </p:nvSpPr>
-        <p:spPr>
-          <a:xfrm>
-            <a:off x="4274739" y="2402431"/>
-            <a:ext cx="1947343" cy="246221"/>
-          </a:xfrm>
-          <a:prstGeom prst="rect">
-            <a:avLst/>
-          </a:prstGeom>
-          <a:noFill/>
-        </p:spPr>
-        <p:txBody>
-          <a:bodyPr wrap="square" rtlCol="0">
-            <a:spAutoFit/>
-          </a:bodyPr>
-          <a:lstStyle/>
-          <a:p>
-            <a:pPr algn="r"/>
-            <a:r>
-              <a:rPr lang="en-US" sz="1000">
-                <a:latin typeface="Consolas"/>
-                <a:cs typeface="Consolas"/>
-              </a:rPr>
-              <a:t>OK</a:t>
-            </a:r>
-          </a:p>
-        </p:txBody>
-      </p:sp>
-      <p:cxnSp>
-        <p:nvCxnSpPr>
-          <p:cNvPr id="22" name="Straight Arrow Connector 21"/>
-          <p:cNvCxnSpPr/>
-          <p:nvPr/>
-        </p:nvCxnSpPr>
-        <p:spPr bwMode="auto">
-          <a:xfrm>
-            <a:off x="1920052" y="2955759"/>
-            <a:ext cx="4672522" cy="0"/>
-          </a:xfrm>
-          <a:prstGeom prst="straightConnector1">
-            <a:avLst/>
-          </a:prstGeom>
-          <a:solidFill>
-            <a:schemeClr val="accent1"/>
-          </a:solidFill>
-          <a:ln w="12700" cap="flat" cmpd="sng" algn="ctr">
-            <a:solidFill>
-              <a:schemeClr val="tx1"/>
-            </a:solidFill>
-            <a:prstDash val="solid"/>
-            <a:round/>
-            <a:headEnd type="none" w="med" len="med"/>
-            <a:tailEnd type="arrow"/>
-          </a:ln>
-          <a:effectLst/>
-        </p:spPr>
-      </p:cxnSp>
-      <p:sp>
-        <p:nvSpPr>
-          <p:cNvPr id="23" name="TextBox 22"/>
-          <p:cNvSpPr txBox="1"/>
-          <p:nvPr/>
-        </p:nvSpPr>
-        <p:spPr>
-          <a:xfrm>
-            <a:off x="2372604" y="2742738"/>
-            <a:ext cx="2511400" cy="246221"/>
-          </a:xfrm>
-          <a:prstGeom prst="rect">
-            <a:avLst/>
-          </a:prstGeom>
-          <a:noFill/>
-        </p:spPr>
-        <p:txBody>
-          <a:bodyPr wrap="none" rtlCol="0">
-            <a:spAutoFit/>
-          </a:bodyPr>
-          <a:lstStyle/>
-          <a:p>
-            <a:r>
-              <a:rPr lang="en-US" sz="1000">
-                <a:latin typeface="Consolas"/>
-                <a:cs typeface="Consolas"/>
-              </a:rPr>
-              <a:t>Write: APDU Commands (fragment 0)</a:t>
-            </a:r>
-          </a:p>
-        </p:txBody>
-      </p:sp>
-      <p:cxnSp>
-        <p:nvCxnSpPr>
-          <p:cNvPr id="24" name="Straight Arrow Connector 23"/>
-          <p:cNvCxnSpPr/>
-          <p:nvPr/>
-        </p:nvCxnSpPr>
-        <p:spPr bwMode="auto">
-          <a:xfrm>
-            <a:off x="1910053" y="3230783"/>
-            <a:ext cx="4672522" cy="0"/>
-          </a:xfrm>
-          <a:prstGeom prst="straightConnector1">
-            <a:avLst/>
-          </a:prstGeom>
-          <a:solidFill>
-            <a:schemeClr val="accent1"/>
-          </a:solidFill>
-          <a:ln w="12700" cap="flat" cmpd="sng" algn="ctr">
-            <a:solidFill>
-              <a:schemeClr val="tx1"/>
-            </a:solidFill>
-            <a:prstDash val="solid"/>
-            <a:round/>
-            <a:headEnd type="none" w="med" len="med"/>
-            <a:tailEnd type="arrow"/>
-          </a:ln>
-          <a:effectLst/>
-        </p:spPr>
-      </p:cxnSp>
-      <p:sp>
-        <p:nvSpPr>
-          <p:cNvPr id="25" name="TextBox 24"/>
-          <p:cNvSpPr txBox="1"/>
-          <p:nvPr/>
-        </p:nvSpPr>
-        <p:spPr>
-          <a:xfrm>
-            <a:off x="2362605" y="3017762"/>
-            <a:ext cx="2511400" cy="246221"/>
-          </a:xfrm>
-          <a:prstGeom prst="rect">
-            <a:avLst/>
-          </a:prstGeom>
-          <a:noFill/>
-        </p:spPr>
-        <p:txBody>
-          <a:bodyPr wrap="none" rtlCol="0">
-            <a:spAutoFit/>
-          </a:bodyPr>
-          <a:lstStyle/>
-          <a:p>
-            <a:r>
-              <a:rPr lang="en-US" sz="1000">
-                <a:latin typeface="Consolas"/>
-                <a:cs typeface="Consolas"/>
-              </a:rPr>
-              <a:t>Write: APDU Commands (fragment 1)</a:t>
-            </a:r>
-          </a:p>
-        </p:txBody>
-      </p:sp>
-      <p:cxnSp>
-        <p:nvCxnSpPr>
-          <p:cNvPr id="26" name="Straight Arrow Connector 25"/>
-          <p:cNvCxnSpPr/>
-          <p:nvPr/>
-        </p:nvCxnSpPr>
-        <p:spPr bwMode="auto">
-          <a:xfrm>
-            <a:off x="1910053" y="3522406"/>
-            <a:ext cx="4672522" cy="0"/>
-          </a:xfrm>
-          <a:prstGeom prst="straightConnector1">
-            <a:avLst/>
-          </a:prstGeom>
-          <a:solidFill>
-            <a:schemeClr val="accent1"/>
-          </a:solidFill>
-          <a:ln w="12700" cap="flat" cmpd="sng" algn="ctr">
-            <a:solidFill>
-              <a:schemeClr val="tx1"/>
-            </a:solidFill>
-            <a:prstDash val="solid"/>
-            <a:round/>
-            <a:headEnd type="none" w="med" len="med"/>
-            <a:tailEnd type="arrow"/>
-          </a:ln>
-          <a:effectLst/>
-        </p:spPr>
-      </p:cxnSp>
-      <p:sp>
-        <p:nvSpPr>
-          <p:cNvPr id="27" name="TextBox 26"/>
-          <p:cNvSpPr txBox="1"/>
-          <p:nvPr/>
-        </p:nvSpPr>
-        <p:spPr>
-          <a:xfrm>
-            <a:off x="2362605" y="3309385"/>
-            <a:ext cx="2511400" cy="246221"/>
-          </a:xfrm>
-          <a:prstGeom prst="rect">
-            <a:avLst/>
-          </a:prstGeom>
-          <a:noFill/>
-        </p:spPr>
-        <p:txBody>
-          <a:bodyPr wrap="none" rtlCol="0">
-            <a:spAutoFit/>
-          </a:bodyPr>
-          <a:lstStyle/>
-          <a:p>
-            <a:r>
-              <a:rPr lang="en-US" sz="1000">
-                <a:latin typeface="Consolas"/>
-                <a:cs typeface="Consolas"/>
-              </a:rPr>
-              <a:t>Write: APDU Commands (fragment 2)</a:t>
-            </a:r>
-          </a:p>
-        </p:txBody>
-      </p:sp>
-      <p:cxnSp>
-        <p:nvCxnSpPr>
-          <p:cNvPr id="28" name="Straight Arrow Connector 27"/>
-          <p:cNvCxnSpPr/>
-          <p:nvPr/>
-        </p:nvCxnSpPr>
-        <p:spPr bwMode="auto">
-          <a:xfrm flipH="1">
-            <a:off x="1910053" y="3965167"/>
-            <a:ext cx="4672522" cy="0"/>
-          </a:xfrm>
-          <a:prstGeom prst="straightConnector1">
-            <a:avLst/>
-          </a:prstGeom>
-          <a:solidFill>
-            <a:schemeClr val="accent1"/>
-          </a:solidFill>
-          <a:ln w="12700" cap="flat" cmpd="sng" algn="ctr">
-            <a:solidFill>
-              <a:schemeClr val="tx1"/>
-            </a:solidFill>
-            <a:prstDash val="solid"/>
-            <a:round/>
-            <a:headEnd type="none" w="med" len="med"/>
-            <a:tailEnd type="arrow"/>
-          </a:ln>
-          <a:effectLst/>
-        </p:spPr>
-      </p:cxnSp>
-      <p:sp>
-        <p:nvSpPr>
-          <p:cNvPr id="29" name="TextBox 28"/>
-          <p:cNvSpPr txBox="1"/>
-          <p:nvPr/>
-        </p:nvSpPr>
-        <p:spPr>
-          <a:xfrm>
-            <a:off x="3474257" y="3752146"/>
-            <a:ext cx="2851107" cy="400110"/>
-          </a:xfrm>
-          <a:prstGeom prst="rect">
-            <a:avLst/>
-          </a:prstGeom>
-          <a:noFill/>
-        </p:spPr>
-        <p:txBody>
-          <a:bodyPr wrap="square" rtlCol="0">
-            <a:spAutoFit/>
-          </a:bodyPr>
-          <a:lstStyle/>
-          <a:p>
-            <a:pPr algn="r"/>
-            <a:r>
-              <a:rPr lang="en-US" sz="1000">
-                <a:latin typeface="Consolas"/>
-                <a:cs typeface="Consolas"/>
-              </a:rPr>
-              <a:t>Notification: APDU Response Ready</a:t>
-            </a:r>
-          </a:p>
-        </p:txBody>
-      </p:sp>
-      <p:cxnSp>
-        <p:nvCxnSpPr>
-          <p:cNvPr id="30" name="Straight Arrow Connector 29"/>
-          <p:cNvCxnSpPr/>
-          <p:nvPr/>
-        </p:nvCxnSpPr>
-        <p:spPr bwMode="auto">
-          <a:xfrm>
-            <a:off x="1910053" y="4311681"/>
-            <a:ext cx="4672522" cy="0"/>
-          </a:xfrm>
-          <a:prstGeom prst="straightConnector1">
-            <a:avLst/>
-          </a:prstGeom>
-          <a:solidFill>
-            <a:schemeClr val="accent1"/>
-          </a:solidFill>
-          <a:ln w="12700" cap="flat" cmpd="sng" algn="ctr">
-            <a:solidFill>
-              <a:schemeClr val="tx1"/>
-            </a:solidFill>
-            <a:prstDash val="solid"/>
-            <a:round/>
-            <a:headEnd type="none" w="med" len="med"/>
-            <a:tailEnd type="arrow"/>
-          </a:ln>
-          <a:effectLst/>
-        </p:spPr>
-      </p:cxnSp>
-      <p:sp>
-        <p:nvSpPr>
-          <p:cNvPr id="31" name="TextBox 30"/>
-          <p:cNvSpPr txBox="1"/>
-          <p:nvPr/>
-        </p:nvSpPr>
-        <p:spPr>
-          <a:xfrm>
-            <a:off x="2362605" y="4098660"/>
-            <a:ext cx="1594808" cy="246221"/>
-          </a:xfrm>
-          <a:prstGeom prst="rect">
-            <a:avLst/>
-          </a:prstGeom>
-          <a:noFill/>
-        </p:spPr>
-        <p:txBody>
-          <a:bodyPr wrap="none" rtlCol="0">
-            <a:spAutoFit/>
-          </a:bodyPr>
-          <a:lstStyle/>
-          <a:p>
-            <a:r>
-              <a:rPr lang="en-US" sz="1000">
-                <a:latin typeface="Consolas"/>
-                <a:cs typeface="Consolas"/>
-              </a:rPr>
-              <a:t>Read: APDU Responses</a:t>
-            </a:r>
-          </a:p>
-        </p:txBody>
-      </p:sp>
-      <p:cxnSp>
-        <p:nvCxnSpPr>
-          <p:cNvPr id="32" name="Straight Arrow Connector 31"/>
-          <p:cNvCxnSpPr/>
-          <p:nvPr/>
-        </p:nvCxnSpPr>
-        <p:spPr bwMode="auto">
-          <a:xfrm flipH="1">
-            <a:off x="1920052" y="4665377"/>
-            <a:ext cx="4672522" cy="0"/>
-          </a:xfrm>
-          <a:prstGeom prst="straightConnector1">
-            <a:avLst/>
-          </a:prstGeom>
-          <a:solidFill>
-            <a:schemeClr val="accent1"/>
-          </a:solidFill>
-          <a:ln w="12700" cap="flat" cmpd="sng" algn="ctr">
-            <a:solidFill>
-              <a:schemeClr val="tx1"/>
-            </a:solidFill>
-            <a:prstDash val="solid"/>
-            <a:round/>
-            <a:headEnd type="none" w="med" len="med"/>
-            <a:tailEnd type="arrow"/>
-          </a:ln>
-          <a:effectLst/>
-        </p:spPr>
-      </p:cxnSp>
-      <p:sp>
-        <p:nvSpPr>
-          <p:cNvPr id="33" name="TextBox 32"/>
-          <p:cNvSpPr txBox="1"/>
-          <p:nvPr/>
-        </p:nvSpPr>
-        <p:spPr>
-          <a:xfrm>
-            <a:off x="3484256" y="4452356"/>
-            <a:ext cx="2851107" cy="246221"/>
-          </a:xfrm>
-          <a:prstGeom prst="rect">
-            <a:avLst/>
-          </a:prstGeom>
-          <a:noFill/>
-        </p:spPr>
-        <p:txBody>
-          <a:bodyPr wrap="square" rtlCol="0">
-            <a:spAutoFit/>
-          </a:bodyPr>
-          <a:lstStyle/>
-          <a:p>
-            <a:pPr algn="r"/>
-            <a:r>
-              <a:rPr lang="en-US" sz="1000">
-                <a:latin typeface="Consolas"/>
-                <a:cs typeface="Consolas"/>
-              </a:rPr>
-              <a:t>APDU Responses (fragment 0)</a:t>
-            </a:r>
-          </a:p>
-        </p:txBody>
-      </p:sp>
-      <p:cxnSp>
-        <p:nvCxnSpPr>
-          <p:cNvPr id="34" name="Straight Arrow Connector 33"/>
-          <p:cNvCxnSpPr/>
-          <p:nvPr/>
-        </p:nvCxnSpPr>
-        <p:spPr bwMode="auto">
-          <a:xfrm flipH="1">
-            <a:off x="1910053" y="4943187"/>
-            <a:ext cx="4672522" cy="0"/>
-          </a:xfrm>
-          <a:prstGeom prst="straightConnector1">
-            <a:avLst/>
-          </a:prstGeom>
-          <a:solidFill>
-            <a:schemeClr val="accent1"/>
-          </a:solidFill>
-          <a:ln w="12700" cap="flat" cmpd="sng" algn="ctr">
-            <a:solidFill>
-              <a:schemeClr val="tx1"/>
-            </a:solidFill>
-            <a:prstDash val="solid"/>
-            <a:round/>
-            <a:headEnd type="none" w="med" len="med"/>
-            <a:tailEnd type="arrow"/>
-          </a:ln>
-          <a:effectLst/>
-        </p:spPr>
-      </p:cxnSp>
-      <p:sp>
-        <p:nvSpPr>
-          <p:cNvPr id="35" name="TextBox 34"/>
-          <p:cNvSpPr txBox="1"/>
-          <p:nvPr/>
-        </p:nvSpPr>
-        <p:spPr>
-          <a:xfrm>
-            <a:off x="3474257" y="4730166"/>
-            <a:ext cx="2851107" cy="246221"/>
-          </a:xfrm>
-          <a:prstGeom prst="rect">
-            <a:avLst/>
-          </a:prstGeom>
-          <a:noFill/>
-        </p:spPr>
-        <p:txBody>
-          <a:bodyPr wrap="square" rtlCol="0">
-            <a:spAutoFit/>
-          </a:bodyPr>
-          <a:lstStyle/>
-          <a:p>
-            <a:pPr algn="r"/>
-            <a:r>
-              <a:rPr lang="en-US" sz="1000">
-                <a:latin typeface="Consolas"/>
-                <a:cs typeface="Consolas"/>
-              </a:rPr>
-              <a:t>APDU Responses (fragment 1)</a:t>
-            </a:r>
-          </a:p>
-        </p:txBody>
-      </p:sp>
-      <p:cxnSp>
-        <p:nvCxnSpPr>
-          <p:cNvPr id="36" name="Straight Arrow Connector 35"/>
-          <p:cNvCxnSpPr/>
-          <p:nvPr/>
-        </p:nvCxnSpPr>
-        <p:spPr bwMode="auto">
-          <a:xfrm>
-            <a:off x="1938478" y="5390700"/>
-            <a:ext cx="4672522" cy="0"/>
-          </a:xfrm>
-          <a:prstGeom prst="straightConnector1">
-            <a:avLst/>
-          </a:prstGeom>
-          <a:solidFill>
-            <a:schemeClr val="accent1"/>
-          </a:solidFill>
-          <a:ln w="12700" cap="flat" cmpd="sng" algn="ctr">
-            <a:solidFill>
-              <a:schemeClr val="tx1"/>
-            </a:solidFill>
-            <a:prstDash val="solid"/>
-            <a:round/>
-            <a:headEnd type="none" w="med" len="med"/>
-            <a:tailEnd type="arrow"/>
-          </a:ln>
-          <a:effectLst/>
-        </p:spPr>
-      </p:cxnSp>
-      <p:sp>
-        <p:nvSpPr>
-          <p:cNvPr id="37" name="TextBox 36"/>
-          <p:cNvSpPr txBox="1"/>
-          <p:nvPr/>
-        </p:nvSpPr>
-        <p:spPr>
-          <a:xfrm>
-            <a:off x="2391030" y="5177679"/>
-            <a:ext cx="2158864" cy="246221"/>
-          </a:xfrm>
-          <a:prstGeom prst="rect">
-            <a:avLst/>
-          </a:prstGeom>
-          <a:noFill/>
-        </p:spPr>
-        <p:txBody>
-          <a:bodyPr wrap="none" rtlCol="0">
-            <a:spAutoFit/>
-          </a:bodyPr>
-          <a:lstStyle/>
-          <a:p>
-            <a:r>
-              <a:rPr lang="en-US" sz="1000">
-                <a:latin typeface="Consolas"/>
-                <a:cs typeface="Consolas"/>
-              </a:rPr>
-              <a:t>Write: Conversation Finished</a:t>
-            </a:r>
-          </a:p>
-        </p:txBody>
-      </p:sp>
-    </p:spTree>
-    <p:extLst>
-      <p:ext uri="{BB962C8B-B14F-4D97-AF65-F5344CB8AC3E}">
-        <p14:creationId xmlns:p14="http://schemas.microsoft.com/office/powerpoint/2010/main" val="2566954667"/>
       </p:ext>
     </p:extLst>
   </p:cSld>

</xml_diff>

<commit_message>
Better explanation of sequences, packets and ble frames
</commit_message>
<xml_diff>
--- a/resources/figures.pptx
+++ b/resources/figures.pptx
@@ -5,16 +5,17 @@
     <p:sldMasterId id="2147483676" r:id="rId1"/>
   </p:sldMasterIdLst>
   <p:notesMasterIdLst>
-    <p:notesMasterId r:id="rId6"/>
+    <p:notesMasterId r:id="rId7"/>
   </p:notesMasterIdLst>
   <p:handoutMasterIdLst>
-    <p:handoutMasterId r:id="rId7"/>
+    <p:handoutMasterId r:id="rId8"/>
   </p:handoutMasterIdLst>
   <p:sldIdLst>
     <p:sldId id="256" r:id="rId2"/>
     <p:sldId id="278" r:id="rId3"/>
     <p:sldId id="279" r:id="rId4"/>
     <p:sldId id="281" r:id="rId5"/>
+    <p:sldId id="282" r:id="rId6"/>
   </p:sldIdLst>
   <p:sldSz cx="9144000" cy="6858000" type="screen4x3"/>
   <p:notesSz cx="6884988" cy="10018713"/>
@@ -461,7 +462,7 @@
               <a:pPr>
                 <a:defRPr/>
               </a:pPr>
-              <a:t>29/07/16</a:t>
+              <a:t>24/08/16</a:t>
             </a:fld>
             <a:endParaRPr lang="en-US" altLang="ja-JP"/>
           </a:p>
@@ -4252,6 +4253,1658 @@
     <p:extLst>
       <p:ext uri="{BB962C8B-B14F-4D97-AF65-F5344CB8AC3E}">
         <p14:creationId xmlns:p14="http://schemas.microsoft.com/office/powerpoint/2010/main" val="2973955845"/>
+      </p:ext>
+    </p:extLst>
+  </p:cSld>
+  <p:clrMapOvr>
+    <a:masterClrMapping/>
+  </p:clrMapOvr>
+</p:sld>
+</file>
+
+<file path=ppt/slides/slide5.xml><?xml version="1.0" encoding="utf-8"?>
+<p:sld xmlns:a="http://schemas.openxmlformats.org/drawingml/2006/main" xmlns:r="http://schemas.openxmlformats.org/officeDocument/2006/relationships" xmlns:p="http://schemas.openxmlformats.org/presentationml/2006/main">
+  <p:cSld>
+    <p:spTree>
+      <p:nvGrpSpPr>
+        <p:cNvPr id="1" name=""/>
+        <p:cNvGrpSpPr/>
+        <p:nvPr/>
+      </p:nvGrpSpPr>
+      <p:grpSpPr>
+        <a:xfrm>
+          <a:off x="0" y="0"/>
+          <a:ext cx="0" cy="0"/>
+          <a:chOff x="0" y="0"/>
+          <a:chExt cx="0" cy="0"/>
+        </a:xfrm>
+      </p:grpSpPr>
+      <p:sp>
+        <p:nvSpPr>
+          <p:cNvPr id="2" name="Rectangle 1"/>
+          <p:cNvSpPr/>
+          <p:nvPr/>
+        </p:nvSpPr>
+        <p:spPr>
+          <a:xfrm>
+            <a:off x="2134049" y="1498557"/>
+            <a:ext cx="266628" cy="261444"/>
+          </a:xfrm>
+          <a:prstGeom prst="rect">
+            <a:avLst/>
+          </a:prstGeom>
+          <a:noFill/>
+          <a:ln w="19050" cmpd="sng">
+            <a:solidFill>
+              <a:schemeClr val="tx1"/>
+            </a:solidFill>
+          </a:ln>
+          <a:effectLst/>
+        </p:spPr>
+        <p:style>
+          <a:lnRef idx="1">
+            <a:schemeClr val="accent1"/>
+          </a:lnRef>
+          <a:fillRef idx="3">
+            <a:schemeClr val="accent1"/>
+          </a:fillRef>
+          <a:effectRef idx="2">
+            <a:schemeClr val="accent1"/>
+          </a:effectRef>
+          <a:fontRef idx="minor">
+            <a:schemeClr val="lt1"/>
+          </a:fontRef>
+        </p:style>
+        <p:txBody>
+          <a:bodyPr lIns="0" tIns="0" rIns="0" bIns="0" rtlCol="0" anchor="ctr"/>
+          <a:lstStyle/>
+          <a:p>
+            <a:pPr algn="ctr"/>
+            <a:r>
+              <a:rPr lang="en-US" sz="1000">
+                <a:solidFill>
+                  <a:schemeClr val="tx1"/>
+                </a:solidFill>
+                <a:latin typeface="Consolas"/>
+                <a:cs typeface="Consolas"/>
+              </a:rPr>
+              <a:t>N</a:t>
+            </a:r>
+          </a:p>
+        </p:txBody>
+      </p:sp>
+      <p:sp>
+        <p:nvSpPr>
+          <p:cNvPr id="3" name="Rectangle 2"/>
+          <p:cNvSpPr/>
+          <p:nvPr/>
+        </p:nvSpPr>
+        <p:spPr>
+          <a:xfrm>
+            <a:off x="2400677" y="1498557"/>
+            <a:ext cx="243173" cy="261444"/>
+          </a:xfrm>
+          <a:prstGeom prst="rect">
+            <a:avLst/>
+          </a:prstGeom>
+          <a:noFill/>
+          <a:ln w="19050" cmpd="sng">
+            <a:solidFill>
+              <a:schemeClr val="tx1"/>
+            </a:solidFill>
+          </a:ln>
+          <a:effectLst/>
+        </p:spPr>
+        <p:style>
+          <a:lnRef idx="1">
+            <a:schemeClr val="accent1"/>
+          </a:lnRef>
+          <a:fillRef idx="3">
+            <a:schemeClr val="accent1"/>
+          </a:fillRef>
+          <a:effectRef idx="2">
+            <a:schemeClr val="accent1"/>
+          </a:effectRef>
+          <a:fontRef idx="minor">
+            <a:schemeClr val="lt1"/>
+          </a:fontRef>
+        </p:style>
+        <p:txBody>
+          <a:bodyPr lIns="0" tIns="0" rIns="0" bIns="0" rtlCol="0" anchor="ctr"/>
+          <a:lstStyle/>
+          <a:p>
+            <a:pPr algn="ctr"/>
+            <a:r>
+              <a:rPr lang="en-US" sz="1000">
+                <a:solidFill>
+                  <a:schemeClr val="tx1"/>
+                </a:solidFill>
+                <a:latin typeface="Consolas"/>
+                <a:cs typeface="Consolas"/>
+              </a:rPr>
+              <a:t>L1</a:t>
+            </a:r>
+          </a:p>
+        </p:txBody>
+      </p:sp>
+      <p:sp>
+        <p:nvSpPr>
+          <p:cNvPr id="4" name="Rectangle 3"/>
+          <p:cNvSpPr/>
+          <p:nvPr/>
+        </p:nvSpPr>
+        <p:spPr>
+          <a:xfrm>
+            <a:off x="2643848" y="1498557"/>
+            <a:ext cx="1037491" cy="261444"/>
+          </a:xfrm>
+          <a:prstGeom prst="rect">
+            <a:avLst/>
+          </a:prstGeom>
+          <a:noFill/>
+          <a:ln w="19050" cmpd="sng">
+            <a:solidFill>
+              <a:schemeClr val="tx1"/>
+            </a:solidFill>
+          </a:ln>
+          <a:effectLst/>
+        </p:spPr>
+        <p:style>
+          <a:lnRef idx="1">
+            <a:schemeClr val="accent1"/>
+          </a:lnRef>
+          <a:fillRef idx="3">
+            <a:schemeClr val="accent1"/>
+          </a:fillRef>
+          <a:effectRef idx="2">
+            <a:schemeClr val="accent1"/>
+          </a:effectRef>
+          <a:fontRef idx="minor">
+            <a:schemeClr val="lt1"/>
+          </a:fontRef>
+        </p:style>
+        <p:txBody>
+          <a:bodyPr lIns="0" tIns="0" rIns="0" bIns="0" rtlCol="0" anchor="ctr"/>
+          <a:lstStyle/>
+          <a:p>
+            <a:pPr algn="ctr"/>
+            <a:r>
+              <a:rPr lang="en-US" sz="1000">
+                <a:solidFill>
+                  <a:schemeClr val="tx1"/>
+                </a:solidFill>
+                <a:latin typeface="Consolas"/>
+                <a:cs typeface="Consolas"/>
+              </a:rPr>
+              <a:t>APDU#1</a:t>
+            </a:r>
+          </a:p>
+        </p:txBody>
+      </p:sp>
+      <p:sp>
+        <p:nvSpPr>
+          <p:cNvPr id="9" name="Rectangle 8"/>
+          <p:cNvSpPr/>
+          <p:nvPr/>
+        </p:nvSpPr>
+        <p:spPr>
+          <a:xfrm>
+            <a:off x="4962001" y="1498557"/>
+            <a:ext cx="1027136" cy="261444"/>
+          </a:xfrm>
+          <a:prstGeom prst="rect">
+            <a:avLst/>
+          </a:prstGeom>
+          <a:noFill/>
+          <a:ln w="19050" cmpd="sng">
+            <a:solidFill>
+              <a:schemeClr val="tx1"/>
+            </a:solidFill>
+          </a:ln>
+          <a:effectLst/>
+        </p:spPr>
+        <p:style>
+          <a:lnRef idx="1">
+            <a:schemeClr val="accent1"/>
+          </a:lnRef>
+          <a:fillRef idx="3">
+            <a:schemeClr val="accent1"/>
+          </a:fillRef>
+          <a:effectRef idx="2">
+            <a:schemeClr val="accent1"/>
+          </a:effectRef>
+          <a:fontRef idx="minor">
+            <a:schemeClr val="lt1"/>
+          </a:fontRef>
+        </p:style>
+        <p:txBody>
+          <a:bodyPr lIns="0" tIns="0" rIns="0" bIns="0" rtlCol="0" anchor="ctr"/>
+          <a:lstStyle/>
+          <a:p>
+            <a:pPr algn="ctr"/>
+            <a:r>
+              <a:rPr lang="en-US" sz="1000">
+                <a:solidFill>
+                  <a:schemeClr val="tx1"/>
+                </a:solidFill>
+                <a:latin typeface="Consolas"/>
+                <a:cs typeface="Consolas"/>
+              </a:rPr>
+              <a:t>···</a:t>
+            </a:r>
+          </a:p>
+        </p:txBody>
+      </p:sp>
+      <p:sp>
+        <p:nvSpPr>
+          <p:cNvPr id="14" name="Rectangle 13"/>
+          <p:cNvSpPr/>
+          <p:nvPr/>
+        </p:nvSpPr>
+        <p:spPr>
+          <a:xfrm>
+            <a:off x="3681339" y="1498557"/>
+            <a:ext cx="243173" cy="261444"/>
+          </a:xfrm>
+          <a:prstGeom prst="rect">
+            <a:avLst/>
+          </a:prstGeom>
+          <a:noFill/>
+          <a:ln w="19050" cmpd="sng">
+            <a:solidFill>
+              <a:schemeClr val="tx1"/>
+            </a:solidFill>
+          </a:ln>
+          <a:effectLst/>
+        </p:spPr>
+        <p:style>
+          <a:lnRef idx="1">
+            <a:schemeClr val="accent1"/>
+          </a:lnRef>
+          <a:fillRef idx="3">
+            <a:schemeClr val="accent1"/>
+          </a:fillRef>
+          <a:effectRef idx="2">
+            <a:schemeClr val="accent1"/>
+          </a:effectRef>
+          <a:fontRef idx="minor">
+            <a:schemeClr val="lt1"/>
+          </a:fontRef>
+        </p:style>
+        <p:txBody>
+          <a:bodyPr lIns="0" tIns="0" rIns="0" bIns="0" rtlCol="0" anchor="ctr"/>
+          <a:lstStyle/>
+          <a:p>
+            <a:pPr algn="ctr"/>
+            <a:r>
+              <a:rPr lang="en-US" sz="1000">
+                <a:solidFill>
+                  <a:schemeClr val="tx1"/>
+                </a:solidFill>
+                <a:latin typeface="Consolas"/>
+                <a:cs typeface="Consolas"/>
+              </a:rPr>
+              <a:t>L2</a:t>
+            </a:r>
+          </a:p>
+        </p:txBody>
+      </p:sp>
+      <p:sp>
+        <p:nvSpPr>
+          <p:cNvPr id="15" name="Rectangle 14"/>
+          <p:cNvSpPr/>
+          <p:nvPr/>
+        </p:nvSpPr>
+        <p:spPr>
+          <a:xfrm>
+            <a:off x="3924510" y="1498557"/>
+            <a:ext cx="1037491" cy="261444"/>
+          </a:xfrm>
+          <a:prstGeom prst="rect">
+            <a:avLst/>
+          </a:prstGeom>
+          <a:noFill/>
+          <a:ln w="19050" cmpd="sng">
+            <a:solidFill>
+              <a:schemeClr val="tx1"/>
+            </a:solidFill>
+          </a:ln>
+          <a:effectLst/>
+        </p:spPr>
+        <p:style>
+          <a:lnRef idx="1">
+            <a:schemeClr val="accent1"/>
+          </a:lnRef>
+          <a:fillRef idx="3">
+            <a:schemeClr val="accent1"/>
+          </a:fillRef>
+          <a:effectRef idx="2">
+            <a:schemeClr val="accent1"/>
+          </a:effectRef>
+          <a:fontRef idx="minor">
+            <a:schemeClr val="lt1"/>
+          </a:fontRef>
+        </p:style>
+        <p:txBody>
+          <a:bodyPr lIns="0" tIns="0" rIns="0" bIns="0" rtlCol="0" anchor="ctr"/>
+          <a:lstStyle/>
+          <a:p>
+            <a:pPr algn="ctr"/>
+            <a:r>
+              <a:rPr lang="en-US" sz="1000">
+                <a:solidFill>
+                  <a:schemeClr val="tx1"/>
+                </a:solidFill>
+                <a:latin typeface="Consolas"/>
+                <a:cs typeface="Consolas"/>
+              </a:rPr>
+              <a:t>APDU#2</a:t>
+            </a:r>
+          </a:p>
+        </p:txBody>
+      </p:sp>
+      <p:sp>
+        <p:nvSpPr>
+          <p:cNvPr id="16" name="Rectangle 15"/>
+          <p:cNvSpPr/>
+          <p:nvPr/>
+        </p:nvSpPr>
+        <p:spPr>
+          <a:xfrm>
+            <a:off x="5993042" y="1498557"/>
+            <a:ext cx="243173" cy="261444"/>
+          </a:xfrm>
+          <a:prstGeom prst="rect">
+            <a:avLst/>
+          </a:prstGeom>
+          <a:noFill/>
+          <a:ln w="19050" cmpd="sng">
+            <a:solidFill>
+              <a:schemeClr val="tx1"/>
+            </a:solidFill>
+          </a:ln>
+          <a:effectLst/>
+        </p:spPr>
+        <p:style>
+          <a:lnRef idx="1">
+            <a:schemeClr val="accent1"/>
+          </a:lnRef>
+          <a:fillRef idx="3">
+            <a:schemeClr val="accent1"/>
+          </a:fillRef>
+          <a:effectRef idx="2">
+            <a:schemeClr val="accent1"/>
+          </a:effectRef>
+          <a:fontRef idx="minor">
+            <a:schemeClr val="lt1"/>
+          </a:fontRef>
+        </p:style>
+        <p:txBody>
+          <a:bodyPr lIns="0" tIns="0" rIns="0" bIns="0" rtlCol="0" anchor="ctr"/>
+          <a:lstStyle/>
+          <a:p>
+            <a:pPr algn="ctr"/>
+            <a:r>
+              <a:rPr lang="en-US" sz="1000">
+                <a:solidFill>
+                  <a:schemeClr val="tx1"/>
+                </a:solidFill>
+                <a:latin typeface="Consolas"/>
+                <a:cs typeface="Consolas"/>
+              </a:rPr>
+              <a:t>Ln</a:t>
+            </a:r>
+          </a:p>
+        </p:txBody>
+      </p:sp>
+      <p:sp>
+        <p:nvSpPr>
+          <p:cNvPr id="17" name="Rectangle 16"/>
+          <p:cNvSpPr/>
+          <p:nvPr/>
+        </p:nvSpPr>
+        <p:spPr>
+          <a:xfrm>
+            <a:off x="6236213" y="1498557"/>
+            <a:ext cx="1037491" cy="261444"/>
+          </a:xfrm>
+          <a:prstGeom prst="rect">
+            <a:avLst/>
+          </a:prstGeom>
+          <a:noFill/>
+          <a:ln w="19050" cmpd="sng">
+            <a:solidFill>
+              <a:schemeClr val="tx1"/>
+            </a:solidFill>
+          </a:ln>
+          <a:effectLst/>
+        </p:spPr>
+        <p:style>
+          <a:lnRef idx="1">
+            <a:schemeClr val="accent1"/>
+          </a:lnRef>
+          <a:fillRef idx="3">
+            <a:schemeClr val="accent1"/>
+          </a:fillRef>
+          <a:effectRef idx="2">
+            <a:schemeClr val="accent1"/>
+          </a:effectRef>
+          <a:fontRef idx="minor">
+            <a:schemeClr val="lt1"/>
+          </a:fontRef>
+        </p:style>
+        <p:txBody>
+          <a:bodyPr lIns="0" tIns="0" rIns="0" bIns="0" rtlCol="0" anchor="ctr"/>
+          <a:lstStyle/>
+          <a:p>
+            <a:pPr algn="ctr"/>
+            <a:r>
+              <a:rPr lang="en-US" sz="1000">
+                <a:solidFill>
+                  <a:schemeClr val="tx1"/>
+                </a:solidFill>
+                <a:latin typeface="Consolas"/>
+                <a:cs typeface="Consolas"/>
+              </a:rPr>
+              <a:t>APDU#n</a:t>
+            </a:r>
+          </a:p>
+        </p:txBody>
+      </p:sp>
+      <p:sp>
+        <p:nvSpPr>
+          <p:cNvPr id="18" name="Left Brace 17"/>
+          <p:cNvSpPr/>
+          <p:nvPr/>
+        </p:nvSpPr>
+        <p:spPr bwMode="auto">
+          <a:xfrm rot="5400000">
+            <a:off x="4488219" y="-845708"/>
+            <a:ext cx="226742" cy="5961779"/>
+          </a:xfrm>
+          <a:prstGeom prst="leftBrace">
+            <a:avLst>
+              <a:gd name="adj1" fmla="val 38334"/>
+              <a:gd name="adj2" fmla="val 50000"/>
+            </a:avLst>
+          </a:prstGeom>
+          <a:noFill/>
+          <a:ln w="12700" cap="flat" cmpd="sng" algn="ctr">
+            <a:solidFill>
+              <a:schemeClr val="tx1">
+                <a:lumMod val="50000"/>
+              </a:schemeClr>
+            </a:solidFill>
+            <a:prstDash val="solid"/>
+            <a:round/>
+            <a:headEnd type="none" w="med" len="med"/>
+            <a:tailEnd type="none" w="med" len="med"/>
+          </a:ln>
+          <a:effectLst/>
+        </p:spPr>
+        <p:txBody>
+          <a:bodyPr vert="horz" wrap="none" lIns="72000" tIns="45720" rIns="72000" bIns="45720" numCol="1" rtlCol="0" anchor="t" anchorCtr="0" compatLnSpc="1">
+            <a:prstTxWarp prst="textNoShape">
+              <a:avLst/>
+            </a:prstTxWarp>
+          </a:bodyPr>
+          <a:lstStyle/>
+          <a:p>
+            <a:pPr marL="0" marR="0" indent="0" algn="l" defTabSz="914400" rtl="0" eaLnBrk="1" fontAlgn="base" latinLnBrk="0" hangingPunct="1">
+              <a:lnSpc>
+                <a:spcPct val="100000"/>
+              </a:lnSpc>
+              <a:spcBef>
+                <a:spcPct val="50000"/>
+              </a:spcBef>
+              <a:spcAft>
+                <a:spcPct val="0"/>
+              </a:spcAft>
+              <a:buClrTx/>
+              <a:buSzTx/>
+              <a:buFontTx/>
+              <a:buNone/>
+              <a:tabLst/>
+            </a:pPr>
+            <a:endParaRPr kumimoji="0" lang="en-US" sz="2000" b="0" i="0" u="none" strike="noStrike" cap="none" normalizeH="0" baseline="0" smtClean="0">
+              <a:ln>
+                <a:noFill/>
+              </a:ln>
+              <a:solidFill>
+                <a:schemeClr val="tx1"/>
+              </a:solidFill>
+              <a:effectLst/>
+              <a:latin typeface="Arial" charset="0"/>
+            </a:endParaRPr>
+          </a:p>
+        </p:txBody>
+      </p:sp>
+      <p:sp>
+        <p:nvSpPr>
+          <p:cNvPr id="19" name="TextBox 18"/>
+          <p:cNvSpPr txBox="1"/>
+          <p:nvPr/>
+        </p:nvSpPr>
+        <p:spPr>
+          <a:xfrm>
+            <a:off x="2134049" y="1178959"/>
+            <a:ext cx="4145887" cy="246221"/>
+          </a:xfrm>
+          <a:prstGeom prst="rect">
+            <a:avLst/>
+          </a:prstGeom>
+          <a:noFill/>
+        </p:spPr>
+        <p:txBody>
+          <a:bodyPr wrap="none" rtlCol="0">
+            <a:spAutoFit/>
+          </a:bodyPr>
+          <a:lstStyle/>
+          <a:p>
+            <a:r>
+              <a:rPr lang="en-US" sz="1000">
+                <a:latin typeface="Consolas"/>
+                <a:cs typeface="Consolas"/>
+              </a:rPr>
+              <a:t>APDU sequence. Length ≤ “Max Memory for APDU processing”</a:t>
+            </a:r>
+          </a:p>
+        </p:txBody>
+      </p:sp>
+      <p:grpSp>
+        <p:nvGrpSpPr>
+          <p:cNvPr id="28" name="Group 27"/>
+          <p:cNvGrpSpPr/>
+          <p:nvPr/>
+        </p:nvGrpSpPr>
+        <p:grpSpPr>
+          <a:xfrm>
+            <a:off x="1647533" y="2609021"/>
+            <a:ext cx="1859971" cy="261444"/>
+            <a:chOff x="975239" y="1941250"/>
+            <a:chExt cx="1859971" cy="261444"/>
+          </a:xfrm>
+        </p:grpSpPr>
+        <p:sp>
+          <p:nvSpPr>
+            <p:cNvPr id="25" name="Rectangle 24"/>
+            <p:cNvSpPr/>
+            <p:nvPr/>
+          </p:nvSpPr>
+          <p:spPr>
+            <a:xfrm>
+              <a:off x="975239" y="1941250"/>
+              <a:ext cx="266628" cy="261444"/>
+            </a:xfrm>
+            <a:prstGeom prst="rect">
+              <a:avLst/>
+            </a:prstGeom>
+            <a:noFill/>
+            <a:ln w="19050" cmpd="sng">
+              <a:solidFill>
+                <a:schemeClr val="tx1"/>
+              </a:solidFill>
+            </a:ln>
+            <a:effectLst/>
+          </p:spPr>
+          <p:style>
+            <a:lnRef idx="1">
+              <a:schemeClr val="accent1"/>
+            </a:lnRef>
+            <a:fillRef idx="3">
+              <a:schemeClr val="accent1"/>
+            </a:fillRef>
+            <a:effectRef idx="2">
+              <a:schemeClr val="accent1"/>
+            </a:effectRef>
+            <a:fontRef idx="minor">
+              <a:schemeClr val="lt1"/>
+            </a:fontRef>
+          </p:style>
+          <p:txBody>
+            <a:bodyPr lIns="0" tIns="0" rIns="0" bIns="0" rtlCol="0" anchor="ctr"/>
+            <a:lstStyle/>
+            <a:p>
+              <a:pPr algn="ctr"/>
+              <a:r>
+                <a:rPr lang="en-US" sz="1000">
+                  <a:solidFill>
+                    <a:schemeClr val="tx1"/>
+                  </a:solidFill>
+                  <a:latin typeface="Consolas"/>
+                  <a:cs typeface="Consolas"/>
+                </a:rPr>
+                <a:t>tp</a:t>
+              </a:r>
+            </a:p>
+          </p:txBody>
+        </p:sp>
+        <p:sp>
+          <p:nvSpPr>
+            <p:cNvPr id="26" name="Rectangle 25"/>
+            <p:cNvSpPr/>
+            <p:nvPr/>
+          </p:nvSpPr>
+          <p:spPr>
+            <a:xfrm>
+              <a:off x="1241867" y="1941250"/>
+              <a:ext cx="243173" cy="261444"/>
+            </a:xfrm>
+            <a:prstGeom prst="rect">
+              <a:avLst/>
+            </a:prstGeom>
+            <a:noFill/>
+            <a:ln w="19050" cmpd="sng">
+              <a:solidFill>
+                <a:schemeClr val="tx1"/>
+              </a:solidFill>
+            </a:ln>
+            <a:effectLst/>
+          </p:spPr>
+          <p:style>
+            <a:lnRef idx="1">
+              <a:schemeClr val="accent1"/>
+            </a:lnRef>
+            <a:fillRef idx="3">
+              <a:schemeClr val="accent1"/>
+            </a:fillRef>
+            <a:effectRef idx="2">
+              <a:schemeClr val="accent1"/>
+            </a:effectRef>
+            <a:fontRef idx="minor">
+              <a:schemeClr val="lt1"/>
+            </a:fontRef>
+          </p:style>
+          <p:txBody>
+            <a:bodyPr lIns="0" tIns="0" rIns="0" bIns="0" rtlCol="0" anchor="ctr"/>
+            <a:lstStyle/>
+            <a:p>
+              <a:pPr algn="ctr"/>
+              <a:r>
+                <a:rPr lang="en-US" sz="1000">
+                  <a:solidFill>
+                    <a:schemeClr val="tx1"/>
+                  </a:solidFill>
+                  <a:latin typeface="Consolas"/>
+                  <a:cs typeface="Consolas"/>
+                </a:rPr>
+                <a:t>pn</a:t>
+              </a:r>
+            </a:p>
+          </p:txBody>
+        </p:sp>
+        <p:sp>
+          <p:nvSpPr>
+            <p:cNvPr id="27" name="Rectangle 26"/>
+            <p:cNvSpPr/>
+            <p:nvPr/>
+          </p:nvSpPr>
+          <p:spPr>
+            <a:xfrm>
+              <a:off x="1485038" y="1941250"/>
+              <a:ext cx="1350172" cy="261444"/>
+            </a:xfrm>
+            <a:prstGeom prst="rect">
+              <a:avLst/>
+            </a:prstGeom>
+            <a:noFill/>
+            <a:ln w="19050" cmpd="sng">
+              <a:solidFill>
+                <a:schemeClr val="tx1"/>
+              </a:solidFill>
+            </a:ln>
+            <a:effectLst/>
+          </p:spPr>
+          <p:style>
+            <a:lnRef idx="1">
+              <a:schemeClr val="accent1"/>
+            </a:lnRef>
+            <a:fillRef idx="3">
+              <a:schemeClr val="accent1"/>
+            </a:fillRef>
+            <a:effectRef idx="2">
+              <a:schemeClr val="accent1"/>
+            </a:effectRef>
+            <a:fontRef idx="minor">
+              <a:schemeClr val="lt1"/>
+            </a:fontRef>
+          </p:style>
+          <p:txBody>
+            <a:bodyPr lIns="0" tIns="0" rIns="0" bIns="0" rtlCol="0" anchor="ctr"/>
+            <a:lstStyle/>
+            <a:p>
+              <a:pPr algn="ctr"/>
+              <a:r>
+                <a:rPr lang="en-US" sz="1000">
+                  <a:solidFill>
+                    <a:schemeClr val="tx1"/>
+                  </a:solidFill>
+                  <a:latin typeface="Consolas"/>
+                  <a:cs typeface="Consolas"/>
+                </a:rPr>
+                <a:t>data</a:t>
+              </a:r>
+            </a:p>
+          </p:txBody>
+        </p:sp>
+      </p:grpSp>
+      <p:grpSp>
+        <p:nvGrpSpPr>
+          <p:cNvPr id="29" name="Group 28"/>
+          <p:cNvGrpSpPr/>
+          <p:nvPr/>
+        </p:nvGrpSpPr>
+        <p:grpSpPr>
+          <a:xfrm>
+            <a:off x="3692959" y="2609021"/>
+            <a:ext cx="1859971" cy="261444"/>
+            <a:chOff x="975239" y="1941250"/>
+            <a:chExt cx="1859971" cy="261444"/>
+          </a:xfrm>
+        </p:grpSpPr>
+        <p:sp>
+          <p:nvSpPr>
+            <p:cNvPr id="30" name="Rectangle 29"/>
+            <p:cNvSpPr/>
+            <p:nvPr/>
+          </p:nvSpPr>
+          <p:spPr>
+            <a:xfrm>
+              <a:off x="975239" y="1941250"/>
+              <a:ext cx="266628" cy="261444"/>
+            </a:xfrm>
+            <a:prstGeom prst="rect">
+              <a:avLst/>
+            </a:prstGeom>
+            <a:noFill/>
+            <a:ln w="19050" cmpd="sng">
+              <a:solidFill>
+                <a:schemeClr val="tx1"/>
+              </a:solidFill>
+            </a:ln>
+            <a:effectLst/>
+          </p:spPr>
+          <p:style>
+            <a:lnRef idx="1">
+              <a:schemeClr val="accent1"/>
+            </a:lnRef>
+            <a:fillRef idx="3">
+              <a:schemeClr val="accent1"/>
+            </a:fillRef>
+            <a:effectRef idx="2">
+              <a:schemeClr val="accent1"/>
+            </a:effectRef>
+            <a:fontRef idx="minor">
+              <a:schemeClr val="lt1"/>
+            </a:fontRef>
+          </p:style>
+          <p:txBody>
+            <a:bodyPr lIns="0" tIns="0" rIns="0" bIns="0" rtlCol="0" anchor="ctr"/>
+            <a:lstStyle/>
+            <a:p>
+              <a:pPr algn="ctr"/>
+              <a:r>
+                <a:rPr lang="en-US" sz="1000">
+                  <a:solidFill>
+                    <a:schemeClr val="tx1"/>
+                  </a:solidFill>
+                  <a:latin typeface="Consolas"/>
+                  <a:cs typeface="Consolas"/>
+                </a:rPr>
+                <a:t>tp</a:t>
+              </a:r>
+            </a:p>
+          </p:txBody>
+        </p:sp>
+        <p:sp>
+          <p:nvSpPr>
+            <p:cNvPr id="31" name="Rectangle 30"/>
+            <p:cNvSpPr/>
+            <p:nvPr/>
+          </p:nvSpPr>
+          <p:spPr>
+            <a:xfrm>
+              <a:off x="1241867" y="1941250"/>
+              <a:ext cx="243173" cy="261444"/>
+            </a:xfrm>
+            <a:prstGeom prst="rect">
+              <a:avLst/>
+            </a:prstGeom>
+            <a:noFill/>
+            <a:ln w="19050" cmpd="sng">
+              <a:solidFill>
+                <a:schemeClr val="tx1"/>
+              </a:solidFill>
+            </a:ln>
+            <a:effectLst/>
+          </p:spPr>
+          <p:style>
+            <a:lnRef idx="1">
+              <a:schemeClr val="accent1"/>
+            </a:lnRef>
+            <a:fillRef idx="3">
+              <a:schemeClr val="accent1"/>
+            </a:fillRef>
+            <a:effectRef idx="2">
+              <a:schemeClr val="accent1"/>
+            </a:effectRef>
+            <a:fontRef idx="minor">
+              <a:schemeClr val="lt1"/>
+            </a:fontRef>
+          </p:style>
+          <p:txBody>
+            <a:bodyPr lIns="0" tIns="0" rIns="0" bIns="0" rtlCol="0" anchor="ctr"/>
+            <a:lstStyle/>
+            <a:p>
+              <a:pPr algn="ctr"/>
+              <a:r>
+                <a:rPr lang="en-US" sz="1000">
+                  <a:solidFill>
+                    <a:schemeClr val="tx1"/>
+                  </a:solidFill>
+                  <a:latin typeface="Consolas"/>
+                  <a:cs typeface="Consolas"/>
+                </a:rPr>
+                <a:t>pn</a:t>
+              </a:r>
+            </a:p>
+          </p:txBody>
+        </p:sp>
+        <p:sp>
+          <p:nvSpPr>
+            <p:cNvPr id="32" name="Rectangle 31"/>
+            <p:cNvSpPr/>
+            <p:nvPr/>
+          </p:nvSpPr>
+          <p:spPr>
+            <a:xfrm>
+              <a:off x="1485038" y="1941250"/>
+              <a:ext cx="1350172" cy="261444"/>
+            </a:xfrm>
+            <a:prstGeom prst="rect">
+              <a:avLst/>
+            </a:prstGeom>
+            <a:noFill/>
+            <a:ln w="19050" cmpd="sng">
+              <a:solidFill>
+                <a:schemeClr val="tx1"/>
+              </a:solidFill>
+            </a:ln>
+            <a:effectLst/>
+          </p:spPr>
+          <p:style>
+            <a:lnRef idx="1">
+              <a:schemeClr val="accent1"/>
+            </a:lnRef>
+            <a:fillRef idx="3">
+              <a:schemeClr val="accent1"/>
+            </a:fillRef>
+            <a:effectRef idx="2">
+              <a:schemeClr val="accent1"/>
+            </a:effectRef>
+            <a:fontRef idx="minor">
+              <a:schemeClr val="lt1"/>
+            </a:fontRef>
+          </p:style>
+          <p:txBody>
+            <a:bodyPr lIns="0" tIns="0" rIns="0" bIns="0" rtlCol="0" anchor="ctr"/>
+            <a:lstStyle/>
+            <a:p>
+              <a:pPr algn="ctr"/>
+              <a:r>
+                <a:rPr lang="en-US" sz="1000">
+                  <a:solidFill>
+                    <a:schemeClr val="tx1"/>
+                  </a:solidFill>
+                  <a:latin typeface="Consolas"/>
+                  <a:cs typeface="Consolas"/>
+                </a:rPr>
+                <a:t>data</a:t>
+              </a:r>
+            </a:p>
+          </p:txBody>
+        </p:sp>
+      </p:grpSp>
+      <p:grpSp>
+        <p:nvGrpSpPr>
+          <p:cNvPr id="33" name="Group 32"/>
+          <p:cNvGrpSpPr/>
+          <p:nvPr/>
+        </p:nvGrpSpPr>
+        <p:grpSpPr>
+          <a:xfrm>
+            <a:off x="5722509" y="2596980"/>
+            <a:ext cx="1859971" cy="261444"/>
+            <a:chOff x="975239" y="1941250"/>
+            <a:chExt cx="1859971" cy="261444"/>
+          </a:xfrm>
+        </p:grpSpPr>
+        <p:sp>
+          <p:nvSpPr>
+            <p:cNvPr id="34" name="Rectangle 33"/>
+            <p:cNvSpPr/>
+            <p:nvPr/>
+          </p:nvSpPr>
+          <p:spPr>
+            <a:xfrm>
+              <a:off x="975239" y="1941250"/>
+              <a:ext cx="266628" cy="261444"/>
+            </a:xfrm>
+            <a:prstGeom prst="rect">
+              <a:avLst/>
+            </a:prstGeom>
+            <a:noFill/>
+            <a:ln w="19050" cmpd="sng">
+              <a:solidFill>
+                <a:schemeClr val="tx1"/>
+              </a:solidFill>
+            </a:ln>
+            <a:effectLst/>
+          </p:spPr>
+          <p:style>
+            <a:lnRef idx="1">
+              <a:schemeClr val="accent1"/>
+            </a:lnRef>
+            <a:fillRef idx="3">
+              <a:schemeClr val="accent1"/>
+            </a:fillRef>
+            <a:effectRef idx="2">
+              <a:schemeClr val="accent1"/>
+            </a:effectRef>
+            <a:fontRef idx="minor">
+              <a:schemeClr val="lt1"/>
+            </a:fontRef>
+          </p:style>
+          <p:txBody>
+            <a:bodyPr lIns="0" tIns="0" rIns="0" bIns="0" rtlCol="0" anchor="ctr"/>
+            <a:lstStyle/>
+            <a:p>
+              <a:pPr algn="ctr"/>
+              <a:r>
+                <a:rPr lang="en-US" sz="1000">
+                  <a:solidFill>
+                    <a:schemeClr val="tx1"/>
+                  </a:solidFill>
+                  <a:latin typeface="Consolas"/>
+                  <a:cs typeface="Consolas"/>
+                </a:rPr>
+                <a:t>tp</a:t>
+              </a:r>
+            </a:p>
+          </p:txBody>
+        </p:sp>
+        <p:sp>
+          <p:nvSpPr>
+            <p:cNvPr id="35" name="Rectangle 34"/>
+            <p:cNvSpPr/>
+            <p:nvPr/>
+          </p:nvSpPr>
+          <p:spPr>
+            <a:xfrm>
+              <a:off x="1241867" y="1941250"/>
+              <a:ext cx="243173" cy="261444"/>
+            </a:xfrm>
+            <a:prstGeom prst="rect">
+              <a:avLst/>
+            </a:prstGeom>
+            <a:noFill/>
+            <a:ln w="19050" cmpd="sng">
+              <a:solidFill>
+                <a:schemeClr val="tx1"/>
+              </a:solidFill>
+            </a:ln>
+            <a:effectLst/>
+          </p:spPr>
+          <p:style>
+            <a:lnRef idx="1">
+              <a:schemeClr val="accent1"/>
+            </a:lnRef>
+            <a:fillRef idx="3">
+              <a:schemeClr val="accent1"/>
+            </a:fillRef>
+            <a:effectRef idx="2">
+              <a:schemeClr val="accent1"/>
+            </a:effectRef>
+            <a:fontRef idx="minor">
+              <a:schemeClr val="lt1"/>
+            </a:fontRef>
+          </p:style>
+          <p:txBody>
+            <a:bodyPr lIns="0" tIns="0" rIns="0" bIns="0" rtlCol="0" anchor="ctr"/>
+            <a:lstStyle/>
+            <a:p>
+              <a:pPr algn="ctr"/>
+              <a:r>
+                <a:rPr lang="en-US" sz="1000">
+                  <a:solidFill>
+                    <a:schemeClr val="tx1"/>
+                  </a:solidFill>
+                  <a:latin typeface="Consolas"/>
+                  <a:cs typeface="Consolas"/>
+                </a:rPr>
+                <a:t>pn</a:t>
+              </a:r>
+            </a:p>
+          </p:txBody>
+        </p:sp>
+        <p:sp>
+          <p:nvSpPr>
+            <p:cNvPr id="36" name="Rectangle 35"/>
+            <p:cNvSpPr/>
+            <p:nvPr/>
+          </p:nvSpPr>
+          <p:spPr>
+            <a:xfrm>
+              <a:off x="1485038" y="1941250"/>
+              <a:ext cx="1350172" cy="261444"/>
+            </a:xfrm>
+            <a:prstGeom prst="rect">
+              <a:avLst/>
+            </a:prstGeom>
+            <a:noFill/>
+            <a:ln w="19050" cmpd="sng">
+              <a:solidFill>
+                <a:schemeClr val="tx1"/>
+              </a:solidFill>
+            </a:ln>
+            <a:effectLst/>
+          </p:spPr>
+          <p:style>
+            <a:lnRef idx="1">
+              <a:schemeClr val="accent1"/>
+            </a:lnRef>
+            <a:fillRef idx="3">
+              <a:schemeClr val="accent1"/>
+            </a:fillRef>
+            <a:effectRef idx="2">
+              <a:schemeClr val="accent1"/>
+            </a:effectRef>
+            <a:fontRef idx="minor">
+              <a:schemeClr val="lt1"/>
+            </a:fontRef>
+          </p:style>
+          <p:txBody>
+            <a:bodyPr lIns="0" tIns="0" rIns="0" bIns="0" rtlCol="0" anchor="ctr"/>
+            <a:lstStyle/>
+            <a:p>
+              <a:pPr algn="ctr"/>
+              <a:r>
+                <a:rPr lang="en-US" sz="1000">
+                  <a:solidFill>
+                    <a:schemeClr val="tx1"/>
+                  </a:solidFill>
+                  <a:latin typeface="Consolas"/>
+                  <a:cs typeface="Consolas"/>
+                </a:rPr>
+                <a:t>data</a:t>
+              </a:r>
+            </a:p>
+          </p:txBody>
+        </p:sp>
+      </p:grpSp>
+      <p:sp>
+        <p:nvSpPr>
+          <p:cNvPr id="37" name="TextBox 36"/>
+          <p:cNvSpPr txBox="1"/>
+          <p:nvPr/>
+        </p:nvSpPr>
+        <p:spPr>
+          <a:xfrm>
+            <a:off x="1575981" y="2331051"/>
+            <a:ext cx="5979071" cy="246221"/>
+          </a:xfrm>
+          <a:prstGeom prst="rect">
+            <a:avLst/>
+          </a:prstGeom>
+          <a:noFill/>
+        </p:spPr>
+        <p:txBody>
+          <a:bodyPr wrap="none" rtlCol="0">
+            <a:spAutoFit/>
+          </a:bodyPr>
+          <a:lstStyle/>
+          <a:p>
+            <a:r>
+              <a:rPr lang="en-US" sz="1000">
+                <a:latin typeface="Consolas"/>
+                <a:cs typeface="Consolas"/>
+              </a:rPr>
+              <a:t>APDU command packets. Max length = length for ‘APDU Commands’ write characteristic</a:t>
+            </a:r>
+          </a:p>
+        </p:txBody>
+      </p:sp>
+      <p:sp>
+        <p:nvSpPr>
+          <p:cNvPr id="38" name="TextBox 37"/>
+          <p:cNvSpPr txBox="1"/>
+          <p:nvPr/>
+        </p:nvSpPr>
+        <p:spPr>
+          <a:xfrm>
+            <a:off x="1620700" y="3030766"/>
+            <a:ext cx="1665315" cy="400110"/>
+          </a:xfrm>
+          <a:prstGeom prst="rect">
+            <a:avLst/>
+          </a:prstGeom>
+          <a:noFill/>
+        </p:spPr>
+        <p:txBody>
+          <a:bodyPr wrap="none" rtlCol="0">
+            <a:spAutoFit/>
+          </a:bodyPr>
+          <a:lstStyle/>
+          <a:p>
+            <a:r>
+              <a:rPr lang="en-US" sz="1000">
+                <a:latin typeface="Consolas"/>
+                <a:cs typeface="Consolas"/>
+              </a:rPr>
+              <a:t>‘APDU Commands’ write </a:t>
+            </a:r>
+          </a:p>
+          <a:p>
+            <a:r>
+              <a:rPr lang="en-US" sz="1000">
+                <a:latin typeface="Consolas"/>
+                <a:cs typeface="Consolas"/>
+              </a:rPr>
+              <a:t>characteristic</a:t>
+            </a:r>
+          </a:p>
+        </p:txBody>
+      </p:sp>
+      <p:sp>
+        <p:nvSpPr>
+          <p:cNvPr id="39" name="Down Arrow 38"/>
+          <p:cNvSpPr/>
+          <p:nvPr/>
+        </p:nvSpPr>
+        <p:spPr>
+          <a:xfrm rot="16200000">
+            <a:off x="5221557" y="3547455"/>
+            <a:ext cx="280709" cy="1422184"/>
+          </a:xfrm>
+          <a:prstGeom prst="downArrow">
+            <a:avLst/>
+          </a:prstGeom>
+          <a:noFill/>
+          <a:ln w="19050" cmpd="sng">
+            <a:solidFill>
+              <a:schemeClr val="tx1"/>
+            </a:solidFill>
+          </a:ln>
+          <a:effectLst/>
+        </p:spPr>
+        <p:style>
+          <a:lnRef idx="1">
+            <a:schemeClr val="accent1"/>
+          </a:lnRef>
+          <a:fillRef idx="3">
+            <a:schemeClr val="accent1"/>
+          </a:fillRef>
+          <a:effectRef idx="2">
+            <a:schemeClr val="accent1"/>
+          </a:effectRef>
+          <a:fontRef idx="minor">
+            <a:schemeClr val="lt1"/>
+          </a:fontRef>
+        </p:style>
+        <p:txBody>
+          <a:bodyPr rtlCol="0" anchor="ctr"/>
+          <a:lstStyle/>
+          <a:p>
+            <a:pPr algn="ctr"/>
+            <a:endParaRPr lang="en-US" sz="1400">
+              <a:solidFill>
+                <a:schemeClr val="tx1"/>
+              </a:solidFill>
+            </a:endParaRPr>
+          </a:p>
+        </p:txBody>
+      </p:sp>
+      <p:sp>
+        <p:nvSpPr>
+          <p:cNvPr id="40" name="Rectangle 39"/>
+          <p:cNvSpPr/>
+          <p:nvPr/>
+        </p:nvSpPr>
+        <p:spPr>
+          <a:xfrm>
+            <a:off x="1140078" y="4137458"/>
+            <a:ext cx="459496" cy="261444"/>
+          </a:xfrm>
+          <a:prstGeom prst="rect">
+            <a:avLst/>
+          </a:prstGeom>
+          <a:noFill/>
+          <a:ln w="19050" cmpd="sng">
+            <a:solidFill>
+              <a:schemeClr val="tx1"/>
+            </a:solidFill>
+          </a:ln>
+          <a:effectLst/>
+        </p:spPr>
+        <p:style>
+          <a:lnRef idx="1">
+            <a:schemeClr val="accent1"/>
+          </a:lnRef>
+          <a:fillRef idx="3">
+            <a:schemeClr val="accent1"/>
+          </a:fillRef>
+          <a:effectRef idx="2">
+            <a:schemeClr val="accent1"/>
+          </a:effectRef>
+          <a:fontRef idx="minor">
+            <a:schemeClr val="lt1"/>
+          </a:fontRef>
+        </p:style>
+        <p:txBody>
+          <a:bodyPr lIns="0" tIns="0" rIns="0" bIns="0" rtlCol="0" anchor="ctr"/>
+          <a:lstStyle/>
+          <a:p>
+            <a:pPr algn="ctr"/>
+            <a:r>
+              <a:rPr lang="en-US" sz="1000">
+                <a:solidFill>
+                  <a:schemeClr val="tx1"/>
+                </a:solidFill>
+                <a:latin typeface="Consolas"/>
+                <a:cs typeface="Consolas"/>
+              </a:rPr>
+              <a:t>ble</a:t>
+            </a:r>
+            <a:endParaRPr lang="en-US" sz="1000">
+              <a:solidFill>
+                <a:schemeClr val="tx1"/>
+              </a:solidFill>
+              <a:latin typeface="Consolas"/>
+              <a:cs typeface="Consolas"/>
+            </a:endParaRPr>
+          </a:p>
+        </p:txBody>
+      </p:sp>
+      <p:sp>
+        <p:nvSpPr>
+          <p:cNvPr id="41" name="Rectangle 40"/>
+          <p:cNvSpPr/>
+          <p:nvPr/>
+        </p:nvSpPr>
+        <p:spPr>
+          <a:xfrm>
+            <a:off x="1720324" y="4137458"/>
+            <a:ext cx="459496" cy="261444"/>
+          </a:xfrm>
+          <a:prstGeom prst="rect">
+            <a:avLst/>
+          </a:prstGeom>
+          <a:noFill/>
+          <a:ln w="19050" cmpd="sng">
+            <a:solidFill>
+              <a:schemeClr val="tx1"/>
+            </a:solidFill>
+          </a:ln>
+          <a:effectLst/>
+        </p:spPr>
+        <p:style>
+          <a:lnRef idx="1">
+            <a:schemeClr val="accent1"/>
+          </a:lnRef>
+          <a:fillRef idx="3">
+            <a:schemeClr val="accent1"/>
+          </a:fillRef>
+          <a:effectRef idx="2">
+            <a:schemeClr val="accent1"/>
+          </a:effectRef>
+          <a:fontRef idx="minor">
+            <a:schemeClr val="lt1"/>
+          </a:fontRef>
+        </p:style>
+        <p:txBody>
+          <a:bodyPr lIns="0" tIns="0" rIns="0" bIns="0" rtlCol="0" anchor="ctr"/>
+          <a:lstStyle/>
+          <a:p>
+            <a:pPr algn="ctr"/>
+            <a:r>
+              <a:rPr lang="en-US" sz="1000">
+                <a:solidFill>
+                  <a:schemeClr val="tx1"/>
+                </a:solidFill>
+                <a:latin typeface="Consolas"/>
+                <a:cs typeface="Consolas"/>
+              </a:rPr>
+              <a:t>ble</a:t>
+            </a:r>
+            <a:endParaRPr lang="en-US" sz="1000">
+              <a:solidFill>
+                <a:schemeClr val="tx1"/>
+              </a:solidFill>
+              <a:latin typeface="Consolas"/>
+              <a:cs typeface="Consolas"/>
+            </a:endParaRPr>
+          </a:p>
+        </p:txBody>
+      </p:sp>
+      <p:sp>
+        <p:nvSpPr>
+          <p:cNvPr id="42" name="Rectangle 41"/>
+          <p:cNvSpPr/>
+          <p:nvPr/>
+        </p:nvSpPr>
+        <p:spPr>
+          <a:xfrm>
+            <a:off x="2300570" y="4137458"/>
+            <a:ext cx="459496" cy="261444"/>
+          </a:xfrm>
+          <a:prstGeom prst="rect">
+            <a:avLst/>
+          </a:prstGeom>
+          <a:noFill/>
+          <a:ln w="19050" cmpd="sng">
+            <a:solidFill>
+              <a:schemeClr val="tx1"/>
+            </a:solidFill>
+          </a:ln>
+          <a:effectLst/>
+        </p:spPr>
+        <p:style>
+          <a:lnRef idx="1">
+            <a:schemeClr val="accent1"/>
+          </a:lnRef>
+          <a:fillRef idx="3">
+            <a:schemeClr val="accent1"/>
+          </a:fillRef>
+          <a:effectRef idx="2">
+            <a:schemeClr val="accent1"/>
+          </a:effectRef>
+          <a:fontRef idx="minor">
+            <a:schemeClr val="lt1"/>
+          </a:fontRef>
+        </p:style>
+        <p:txBody>
+          <a:bodyPr lIns="0" tIns="0" rIns="0" bIns="0" rtlCol="0" anchor="ctr"/>
+          <a:lstStyle/>
+          <a:p>
+            <a:pPr algn="ctr"/>
+            <a:r>
+              <a:rPr lang="en-US" sz="1000">
+                <a:solidFill>
+                  <a:schemeClr val="tx1"/>
+                </a:solidFill>
+                <a:latin typeface="Consolas"/>
+                <a:cs typeface="Consolas"/>
+              </a:rPr>
+              <a:t>ble</a:t>
+            </a:r>
+            <a:endParaRPr lang="en-US" sz="1000">
+              <a:solidFill>
+                <a:schemeClr val="tx1"/>
+              </a:solidFill>
+              <a:latin typeface="Consolas"/>
+              <a:cs typeface="Consolas"/>
+            </a:endParaRPr>
+          </a:p>
+        </p:txBody>
+      </p:sp>
+      <p:sp>
+        <p:nvSpPr>
+          <p:cNvPr id="43" name="Rectangle 42"/>
+          <p:cNvSpPr/>
+          <p:nvPr/>
+        </p:nvSpPr>
+        <p:spPr>
+          <a:xfrm>
+            <a:off x="2880815" y="4137458"/>
+            <a:ext cx="459496" cy="261444"/>
+          </a:xfrm>
+          <a:prstGeom prst="rect">
+            <a:avLst/>
+          </a:prstGeom>
+          <a:noFill/>
+          <a:ln w="19050" cmpd="sng">
+            <a:solidFill>
+              <a:schemeClr val="tx1"/>
+            </a:solidFill>
+          </a:ln>
+          <a:effectLst/>
+        </p:spPr>
+        <p:style>
+          <a:lnRef idx="1">
+            <a:schemeClr val="accent1"/>
+          </a:lnRef>
+          <a:fillRef idx="3">
+            <a:schemeClr val="accent1"/>
+          </a:fillRef>
+          <a:effectRef idx="2">
+            <a:schemeClr val="accent1"/>
+          </a:effectRef>
+          <a:fontRef idx="minor">
+            <a:schemeClr val="lt1"/>
+          </a:fontRef>
+        </p:style>
+        <p:txBody>
+          <a:bodyPr lIns="0" tIns="0" rIns="0" bIns="0" rtlCol="0" anchor="ctr"/>
+          <a:lstStyle/>
+          <a:p>
+            <a:pPr algn="ctr"/>
+            <a:r>
+              <a:rPr lang="en-US" sz="1000">
+                <a:solidFill>
+                  <a:schemeClr val="tx1"/>
+                </a:solidFill>
+                <a:latin typeface="Consolas"/>
+                <a:cs typeface="Consolas"/>
+              </a:rPr>
+              <a:t>ble</a:t>
+            </a:r>
+            <a:endParaRPr lang="en-US" sz="1000">
+              <a:solidFill>
+                <a:schemeClr val="tx1"/>
+              </a:solidFill>
+              <a:latin typeface="Consolas"/>
+              <a:cs typeface="Consolas"/>
+            </a:endParaRPr>
+          </a:p>
+        </p:txBody>
+      </p:sp>
+      <p:sp>
+        <p:nvSpPr>
+          <p:cNvPr id="44" name="TextBox 43"/>
+          <p:cNvSpPr txBox="1"/>
+          <p:nvPr/>
+        </p:nvSpPr>
+        <p:spPr>
+          <a:xfrm>
+            <a:off x="1092456" y="3764195"/>
+            <a:ext cx="2236510" cy="246221"/>
+          </a:xfrm>
+          <a:prstGeom prst="rect">
+            <a:avLst/>
+          </a:prstGeom>
+          <a:noFill/>
+        </p:spPr>
+        <p:txBody>
+          <a:bodyPr wrap="none" rtlCol="0">
+            <a:spAutoFit/>
+          </a:bodyPr>
+          <a:lstStyle/>
+          <a:p>
+            <a:r>
+              <a:rPr lang="en-US" sz="1000">
+                <a:latin typeface="Consolas"/>
+                <a:cs typeface="Consolas"/>
+              </a:rPr>
+              <a:t>BLE packets. Max length = MTU</a:t>
+            </a:r>
+          </a:p>
+        </p:txBody>
+      </p:sp>
+      <p:sp>
+        <p:nvSpPr>
+          <p:cNvPr id="45" name="Left Brace 44"/>
+          <p:cNvSpPr/>
+          <p:nvPr/>
+        </p:nvSpPr>
+        <p:spPr bwMode="auto">
+          <a:xfrm rot="5400000">
+            <a:off x="2421191" y="2260875"/>
+            <a:ext cx="226742" cy="2779900"/>
+          </a:xfrm>
+          <a:prstGeom prst="leftBrace">
+            <a:avLst>
+              <a:gd name="adj1" fmla="val 38334"/>
+              <a:gd name="adj2" fmla="val 50000"/>
+            </a:avLst>
+          </a:prstGeom>
+          <a:noFill/>
+          <a:ln w="12700" cap="flat" cmpd="sng" algn="ctr">
+            <a:solidFill>
+              <a:schemeClr val="tx1">
+                <a:lumMod val="50000"/>
+              </a:schemeClr>
+            </a:solidFill>
+            <a:prstDash val="solid"/>
+            <a:round/>
+            <a:headEnd type="none" w="med" len="med"/>
+            <a:tailEnd type="none" w="med" len="med"/>
+          </a:ln>
+          <a:effectLst/>
+        </p:spPr>
+        <p:txBody>
+          <a:bodyPr vert="horz" wrap="none" lIns="72000" tIns="45720" rIns="72000" bIns="45720" numCol="1" rtlCol="0" anchor="t" anchorCtr="0" compatLnSpc="1">
+            <a:prstTxWarp prst="textNoShape">
+              <a:avLst/>
+            </a:prstTxWarp>
+          </a:bodyPr>
+          <a:lstStyle/>
+          <a:p>
+            <a:pPr marL="0" marR="0" indent="0" algn="l" defTabSz="914400" rtl="0" eaLnBrk="1" fontAlgn="base" latinLnBrk="0" hangingPunct="1">
+              <a:lnSpc>
+                <a:spcPct val="100000"/>
+              </a:lnSpc>
+              <a:spcBef>
+                <a:spcPct val="50000"/>
+              </a:spcBef>
+              <a:spcAft>
+                <a:spcPct val="0"/>
+              </a:spcAft>
+              <a:buClrTx/>
+              <a:buSzTx/>
+              <a:buFontTx/>
+              <a:buNone/>
+              <a:tabLst/>
+            </a:pPr>
+            <a:endParaRPr kumimoji="0" lang="en-US" sz="2000" b="0" i="0" u="none" strike="noStrike" cap="none" normalizeH="0" baseline="0" smtClean="0">
+              <a:ln>
+                <a:noFill/>
+              </a:ln>
+              <a:solidFill>
+                <a:schemeClr val="tx1"/>
+              </a:solidFill>
+              <a:effectLst/>
+              <a:latin typeface="Arial" charset="0"/>
+            </a:endParaRPr>
+          </a:p>
+        </p:txBody>
+      </p:sp>
+      <p:sp>
+        <p:nvSpPr>
+          <p:cNvPr id="46" name="Rectangle 45"/>
+          <p:cNvSpPr/>
+          <p:nvPr/>
+        </p:nvSpPr>
+        <p:spPr>
+          <a:xfrm>
+            <a:off x="3465016" y="4136138"/>
+            <a:ext cx="459496" cy="261444"/>
+          </a:xfrm>
+          <a:prstGeom prst="rect">
+            <a:avLst/>
+          </a:prstGeom>
+          <a:noFill/>
+          <a:ln w="19050" cmpd="sng">
+            <a:solidFill>
+              <a:schemeClr val="tx1"/>
+            </a:solidFill>
+          </a:ln>
+          <a:effectLst/>
+        </p:spPr>
+        <p:style>
+          <a:lnRef idx="1">
+            <a:schemeClr val="accent1"/>
+          </a:lnRef>
+          <a:fillRef idx="3">
+            <a:schemeClr val="accent1"/>
+          </a:fillRef>
+          <a:effectRef idx="2">
+            <a:schemeClr val="accent1"/>
+          </a:effectRef>
+          <a:fontRef idx="minor">
+            <a:schemeClr val="lt1"/>
+          </a:fontRef>
+        </p:style>
+        <p:txBody>
+          <a:bodyPr lIns="0" tIns="0" rIns="0" bIns="0" rtlCol="0" anchor="ctr"/>
+          <a:lstStyle/>
+          <a:p>
+            <a:pPr algn="ctr"/>
+            <a:r>
+              <a:rPr lang="en-US" sz="1000">
+                <a:solidFill>
+                  <a:schemeClr val="tx1"/>
+                </a:solidFill>
+                <a:latin typeface="Consolas"/>
+                <a:cs typeface="Consolas"/>
+              </a:rPr>
+              <a:t>ble</a:t>
+            </a:r>
+            <a:endParaRPr lang="en-US" sz="1000">
+              <a:solidFill>
+                <a:schemeClr val="tx1"/>
+              </a:solidFill>
+              <a:latin typeface="Consolas"/>
+              <a:cs typeface="Consolas"/>
+            </a:endParaRPr>
+          </a:p>
+        </p:txBody>
+      </p:sp>
+      <p:sp>
+        <p:nvSpPr>
+          <p:cNvPr id="48" name="TextBox 47"/>
+          <p:cNvSpPr txBox="1"/>
+          <p:nvPr/>
+        </p:nvSpPr>
+        <p:spPr>
+          <a:xfrm>
+            <a:off x="6441046" y="4032780"/>
+            <a:ext cx="1671054" cy="400110"/>
+          </a:xfrm>
+          <a:prstGeom prst="rect">
+            <a:avLst/>
+          </a:prstGeom>
+          <a:noFill/>
+        </p:spPr>
+        <p:txBody>
+          <a:bodyPr wrap="square" rtlCol="0">
+            <a:spAutoFit/>
+          </a:bodyPr>
+          <a:lstStyle/>
+          <a:p>
+            <a:r>
+              <a:rPr lang="en-US" sz="1000">
+                <a:latin typeface="Consolas"/>
+                <a:cs typeface="Consolas"/>
+              </a:rPr>
+              <a:t>Packets actually transmitted</a:t>
+            </a:r>
+          </a:p>
+        </p:txBody>
+      </p:sp>
+    </p:spTree>
+    <p:extLst>
+      <p:ext uri="{BB962C8B-B14F-4D97-AF65-F5344CB8AC3E}">
+        <p14:creationId xmlns:p14="http://schemas.microsoft.com/office/powerpoint/2010/main" val="2222371330"/>
       </p:ext>
     </p:extLst>
   </p:cSld>

</xml_diff>

<commit_message>
Updates after meeting in Stockholm (#5)
* New characteristic UUIDs to save space on BLE device

* Better explanation of sequences, packets and ble frames
</commit_message>
<xml_diff>
--- a/resources/figures.pptx
+++ b/resources/figures.pptx
@@ -5,16 +5,17 @@
     <p:sldMasterId id="2147483676" r:id="rId1"/>
   </p:sldMasterIdLst>
   <p:notesMasterIdLst>
-    <p:notesMasterId r:id="rId6"/>
+    <p:notesMasterId r:id="rId7"/>
   </p:notesMasterIdLst>
   <p:handoutMasterIdLst>
-    <p:handoutMasterId r:id="rId7"/>
+    <p:handoutMasterId r:id="rId8"/>
   </p:handoutMasterIdLst>
   <p:sldIdLst>
     <p:sldId id="256" r:id="rId2"/>
     <p:sldId id="278" r:id="rId3"/>
     <p:sldId id="279" r:id="rId4"/>
     <p:sldId id="281" r:id="rId5"/>
+    <p:sldId id="282" r:id="rId6"/>
   </p:sldIdLst>
   <p:sldSz cx="9144000" cy="6858000" type="screen4x3"/>
   <p:notesSz cx="6884988" cy="10018713"/>
@@ -461,7 +462,7 @@
               <a:pPr>
                 <a:defRPr/>
               </a:pPr>
-              <a:t>29/07/16</a:t>
+              <a:t>24/08/16</a:t>
             </a:fld>
             <a:endParaRPr lang="en-US" altLang="ja-JP"/>
           </a:p>
@@ -4252,6 +4253,1658 @@
     <p:extLst>
       <p:ext uri="{BB962C8B-B14F-4D97-AF65-F5344CB8AC3E}">
         <p14:creationId xmlns:p14="http://schemas.microsoft.com/office/powerpoint/2010/main" val="2973955845"/>
+      </p:ext>
+    </p:extLst>
+  </p:cSld>
+  <p:clrMapOvr>
+    <a:masterClrMapping/>
+  </p:clrMapOvr>
+</p:sld>
+</file>
+
+<file path=ppt/slides/slide5.xml><?xml version="1.0" encoding="utf-8"?>
+<p:sld xmlns:a="http://schemas.openxmlformats.org/drawingml/2006/main" xmlns:r="http://schemas.openxmlformats.org/officeDocument/2006/relationships" xmlns:p="http://schemas.openxmlformats.org/presentationml/2006/main">
+  <p:cSld>
+    <p:spTree>
+      <p:nvGrpSpPr>
+        <p:cNvPr id="1" name=""/>
+        <p:cNvGrpSpPr/>
+        <p:nvPr/>
+      </p:nvGrpSpPr>
+      <p:grpSpPr>
+        <a:xfrm>
+          <a:off x="0" y="0"/>
+          <a:ext cx="0" cy="0"/>
+          <a:chOff x="0" y="0"/>
+          <a:chExt cx="0" cy="0"/>
+        </a:xfrm>
+      </p:grpSpPr>
+      <p:sp>
+        <p:nvSpPr>
+          <p:cNvPr id="2" name="Rectangle 1"/>
+          <p:cNvSpPr/>
+          <p:nvPr/>
+        </p:nvSpPr>
+        <p:spPr>
+          <a:xfrm>
+            <a:off x="2134049" y="1498557"/>
+            <a:ext cx="266628" cy="261444"/>
+          </a:xfrm>
+          <a:prstGeom prst="rect">
+            <a:avLst/>
+          </a:prstGeom>
+          <a:noFill/>
+          <a:ln w="19050" cmpd="sng">
+            <a:solidFill>
+              <a:schemeClr val="tx1"/>
+            </a:solidFill>
+          </a:ln>
+          <a:effectLst/>
+        </p:spPr>
+        <p:style>
+          <a:lnRef idx="1">
+            <a:schemeClr val="accent1"/>
+          </a:lnRef>
+          <a:fillRef idx="3">
+            <a:schemeClr val="accent1"/>
+          </a:fillRef>
+          <a:effectRef idx="2">
+            <a:schemeClr val="accent1"/>
+          </a:effectRef>
+          <a:fontRef idx="minor">
+            <a:schemeClr val="lt1"/>
+          </a:fontRef>
+        </p:style>
+        <p:txBody>
+          <a:bodyPr lIns="0" tIns="0" rIns="0" bIns="0" rtlCol="0" anchor="ctr"/>
+          <a:lstStyle/>
+          <a:p>
+            <a:pPr algn="ctr"/>
+            <a:r>
+              <a:rPr lang="en-US" sz="1000">
+                <a:solidFill>
+                  <a:schemeClr val="tx1"/>
+                </a:solidFill>
+                <a:latin typeface="Consolas"/>
+                <a:cs typeface="Consolas"/>
+              </a:rPr>
+              <a:t>N</a:t>
+            </a:r>
+          </a:p>
+        </p:txBody>
+      </p:sp>
+      <p:sp>
+        <p:nvSpPr>
+          <p:cNvPr id="3" name="Rectangle 2"/>
+          <p:cNvSpPr/>
+          <p:nvPr/>
+        </p:nvSpPr>
+        <p:spPr>
+          <a:xfrm>
+            <a:off x="2400677" y="1498557"/>
+            <a:ext cx="243173" cy="261444"/>
+          </a:xfrm>
+          <a:prstGeom prst="rect">
+            <a:avLst/>
+          </a:prstGeom>
+          <a:noFill/>
+          <a:ln w="19050" cmpd="sng">
+            <a:solidFill>
+              <a:schemeClr val="tx1"/>
+            </a:solidFill>
+          </a:ln>
+          <a:effectLst/>
+        </p:spPr>
+        <p:style>
+          <a:lnRef idx="1">
+            <a:schemeClr val="accent1"/>
+          </a:lnRef>
+          <a:fillRef idx="3">
+            <a:schemeClr val="accent1"/>
+          </a:fillRef>
+          <a:effectRef idx="2">
+            <a:schemeClr val="accent1"/>
+          </a:effectRef>
+          <a:fontRef idx="minor">
+            <a:schemeClr val="lt1"/>
+          </a:fontRef>
+        </p:style>
+        <p:txBody>
+          <a:bodyPr lIns="0" tIns="0" rIns="0" bIns="0" rtlCol="0" anchor="ctr"/>
+          <a:lstStyle/>
+          <a:p>
+            <a:pPr algn="ctr"/>
+            <a:r>
+              <a:rPr lang="en-US" sz="1000">
+                <a:solidFill>
+                  <a:schemeClr val="tx1"/>
+                </a:solidFill>
+                <a:latin typeface="Consolas"/>
+                <a:cs typeface="Consolas"/>
+              </a:rPr>
+              <a:t>L1</a:t>
+            </a:r>
+          </a:p>
+        </p:txBody>
+      </p:sp>
+      <p:sp>
+        <p:nvSpPr>
+          <p:cNvPr id="4" name="Rectangle 3"/>
+          <p:cNvSpPr/>
+          <p:nvPr/>
+        </p:nvSpPr>
+        <p:spPr>
+          <a:xfrm>
+            <a:off x="2643848" y="1498557"/>
+            <a:ext cx="1037491" cy="261444"/>
+          </a:xfrm>
+          <a:prstGeom prst="rect">
+            <a:avLst/>
+          </a:prstGeom>
+          <a:noFill/>
+          <a:ln w="19050" cmpd="sng">
+            <a:solidFill>
+              <a:schemeClr val="tx1"/>
+            </a:solidFill>
+          </a:ln>
+          <a:effectLst/>
+        </p:spPr>
+        <p:style>
+          <a:lnRef idx="1">
+            <a:schemeClr val="accent1"/>
+          </a:lnRef>
+          <a:fillRef idx="3">
+            <a:schemeClr val="accent1"/>
+          </a:fillRef>
+          <a:effectRef idx="2">
+            <a:schemeClr val="accent1"/>
+          </a:effectRef>
+          <a:fontRef idx="minor">
+            <a:schemeClr val="lt1"/>
+          </a:fontRef>
+        </p:style>
+        <p:txBody>
+          <a:bodyPr lIns="0" tIns="0" rIns="0" bIns="0" rtlCol="0" anchor="ctr"/>
+          <a:lstStyle/>
+          <a:p>
+            <a:pPr algn="ctr"/>
+            <a:r>
+              <a:rPr lang="en-US" sz="1000">
+                <a:solidFill>
+                  <a:schemeClr val="tx1"/>
+                </a:solidFill>
+                <a:latin typeface="Consolas"/>
+                <a:cs typeface="Consolas"/>
+              </a:rPr>
+              <a:t>APDU#1</a:t>
+            </a:r>
+          </a:p>
+        </p:txBody>
+      </p:sp>
+      <p:sp>
+        <p:nvSpPr>
+          <p:cNvPr id="9" name="Rectangle 8"/>
+          <p:cNvSpPr/>
+          <p:nvPr/>
+        </p:nvSpPr>
+        <p:spPr>
+          <a:xfrm>
+            <a:off x="4962001" y="1498557"/>
+            <a:ext cx="1027136" cy="261444"/>
+          </a:xfrm>
+          <a:prstGeom prst="rect">
+            <a:avLst/>
+          </a:prstGeom>
+          <a:noFill/>
+          <a:ln w="19050" cmpd="sng">
+            <a:solidFill>
+              <a:schemeClr val="tx1"/>
+            </a:solidFill>
+          </a:ln>
+          <a:effectLst/>
+        </p:spPr>
+        <p:style>
+          <a:lnRef idx="1">
+            <a:schemeClr val="accent1"/>
+          </a:lnRef>
+          <a:fillRef idx="3">
+            <a:schemeClr val="accent1"/>
+          </a:fillRef>
+          <a:effectRef idx="2">
+            <a:schemeClr val="accent1"/>
+          </a:effectRef>
+          <a:fontRef idx="minor">
+            <a:schemeClr val="lt1"/>
+          </a:fontRef>
+        </p:style>
+        <p:txBody>
+          <a:bodyPr lIns="0" tIns="0" rIns="0" bIns="0" rtlCol="0" anchor="ctr"/>
+          <a:lstStyle/>
+          <a:p>
+            <a:pPr algn="ctr"/>
+            <a:r>
+              <a:rPr lang="en-US" sz="1000">
+                <a:solidFill>
+                  <a:schemeClr val="tx1"/>
+                </a:solidFill>
+                <a:latin typeface="Consolas"/>
+                <a:cs typeface="Consolas"/>
+              </a:rPr>
+              <a:t>···</a:t>
+            </a:r>
+          </a:p>
+        </p:txBody>
+      </p:sp>
+      <p:sp>
+        <p:nvSpPr>
+          <p:cNvPr id="14" name="Rectangle 13"/>
+          <p:cNvSpPr/>
+          <p:nvPr/>
+        </p:nvSpPr>
+        <p:spPr>
+          <a:xfrm>
+            <a:off x="3681339" y="1498557"/>
+            <a:ext cx="243173" cy="261444"/>
+          </a:xfrm>
+          <a:prstGeom prst="rect">
+            <a:avLst/>
+          </a:prstGeom>
+          <a:noFill/>
+          <a:ln w="19050" cmpd="sng">
+            <a:solidFill>
+              <a:schemeClr val="tx1"/>
+            </a:solidFill>
+          </a:ln>
+          <a:effectLst/>
+        </p:spPr>
+        <p:style>
+          <a:lnRef idx="1">
+            <a:schemeClr val="accent1"/>
+          </a:lnRef>
+          <a:fillRef idx="3">
+            <a:schemeClr val="accent1"/>
+          </a:fillRef>
+          <a:effectRef idx="2">
+            <a:schemeClr val="accent1"/>
+          </a:effectRef>
+          <a:fontRef idx="minor">
+            <a:schemeClr val="lt1"/>
+          </a:fontRef>
+        </p:style>
+        <p:txBody>
+          <a:bodyPr lIns="0" tIns="0" rIns="0" bIns="0" rtlCol="0" anchor="ctr"/>
+          <a:lstStyle/>
+          <a:p>
+            <a:pPr algn="ctr"/>
+            <a:r>
+              <a:rPr lang="en-US" sz="1000">
+                <a:solidFill>
+                  <a:schemeClr val="tx1"/>
+                </a:solidFill>
+                <a:latin typeface="Consolas"/>
+                <a:cs typeface="Consolas"/>
+              </a:rPr>
+              <a:t>L2</a:t>
+            </a:r>
+          </a:p>
+        </p:txBody>
+      </p:sp>
+      <p:sp>
+        <p:nvSpPr>
+          <p:cNvPr id="15" name="Rectangle 14"/>
+          <p:cNvSpPr/>
+          <p:nvPr/>
+        </p:nvSpPr>
+        <p:spPr>
+          <a:xfrm>
+            <a:off x="3924510" y="1498557"/>
+            <a:ext cx="1037491" cy="261444"/>
+          </a:xfrm>
+          <a:prstGeom prst="rect">
+            <a:avLst/>
+          </a:prstGeom>
+          <a:noFill/>
+          <a:ln w="19050" cmpd="sng">
+            <a:solidFill>
+              <a:schemeClr val="tx1"/>
+            </a:solidFill>
+          </a:ln>
+          <a:effectLst/>
+        </p:spPr>
+        <p:style>
+          <a:lnRef idx="1">
+            <a:schemeClr val="accent1"/>
+          </a:lnRef>
+          <a:fillRef idx="3">
+            <a:schemeClr val="accent1"/>
+          </a:fillRef>
+          <a:effectRef idx="2">
+            <a:schemeClr val="accent1"/>
+          </a:effectRef>
+          <a:fontRef idx="minor">
+            <a:schemeClr val="lt1"/>
+          </a:fontRef>
+        </p:style>
+        <p:txBody>
+          <a:bodyPr lIns="0" tIns="0" rIns="0" bIns="0" rtlCol="0" anchor="ctr"/>
+          <a:lstStyle/>
+          <a:p>
+            <a:pPr algn="ctr"/>
+            <a:r>
+              <a:rPr lang="en-US" sz="1000">
+                <a:solidFill>
+                  <a:schemeClr val="tx1"/>
+                </a:solidFill>
+                <a:latin typeface="Consolas"/>
+                <a:cs typeface="Consolas"/>
+              </a:rPr>
+              <a:t>APDU#2</a:t>
+            </a:r>
+          </a:p>
+        </p:txBody>
+      </p:sp>
+      <p:sp>
+        <p:nvSpPr>
+          <p:cNvPr id="16" name="Rectangle 15"/>
+          <p:cNvSpPr/>
+          <p:nvPr/>
+        </p:nvSpPr>
+        <p:spPr>
+          <a:xfrm>
+            <a:off x="5993042" y="1498557"/>
+            <a:ext cx="243173" cy="261444"/>
+          </a:xfrm>
+          <a:prstGeom prst="rect">
+            <a:avLst/>
+          </a:prstGeom>
+          <a:noFill/>
+          <a:ln w="19050" cmpd="sng">
+            <a:solidFill>
+              <a:schemeClr val="tx1"/>
+            </a:solidFill>
+          </a:ln>
+          <a:effectLst/>
+        </p:spPr>
+        <p:style>
+          <a:lnRef idx="1">
+            <a:schemeClr val="accent1"/>
+          </a:lnRef>
+          <a:fillRef idx="3">
+            <a:schemeClr val="accent1"/>
+          </a:fillRef>
+          <a:effectRef idx="2">
+            <a:schemeClr val="accent1"/>
+          </a:effectRef>
+          <a:fontRef idx="minor">
+            <a:schemeClr val="lt1"/>
+          </a:fontRef>
+        </p:style>
+        <p:txBody>
+          <a:bodyPr lIns="0" tIns="0" rIns="0" bIns="0" rtlCol="0" anchor="ctr"/>
+          <a:lstStyle/>
+          <a:p>
+            <a:pPr algn="ctr"/>
+            <a:r>
+              <a:rPr lang="en-US" sz="1000">
+                <a:solidFill>
+                  <a:schemeClr val="tx1"/>
+                </a:solidFill>
+                <a:latin typeface="Consolas"/>
+                <a:cs typeface="Consolas"/>
+              </a:rPr>
+              <a:t>Ln</a:t>
+            </a:r>
+          </a:p>
+        </p:txBody>
+      </p:sp>
+      <p:sp>
+        <p:nvSpPr>
+          <p:cNvPr id="17" name="Rectangle 16"/>
+          <p:cNvSpPr/>
+          <p:nvPr/>
+        </p:nvSpPr>
+        <p:spPr>
+          <a:xfrm>
+            <a:off x="6236213" y="1498557"/>
+            <a:ext cx="1037491" cy="261444"/>
+          </a:xfrm>
+          <a:prstGeom prst="rect">
+            <a:avLst/>
+          </a:prstGeom>
+          <a:noFill/>
+          <a:ln w="19050" cmpd="sng">
+            <a:solidFill>
+              <a:schemeClr val="tx1"/>
+            </a:solidFill>
+          </a:ln>
+          <a:effectLst/>
+        </p:spPr>
+        <p:style>
+          <a:lnRef idx="1">
+            <a:schemeClr val="accent1"/>
+          </a:lnRef>
+          <a:fillRef idx="3">
+            <a:schemeClr val="accent1"/>
+          </a:fillRef>
+          <a:effectRef idx="2">
+            <a:schemeClr val="accent1"/>
+          </a:effectRef>
+          <a:fontRef idx="minor">
+            <a:schemeClr val="lt1"/>
+          </a:fontRef>
+        </p:style>
+        <p:txBody>
+          <a:bodyPr lIns="0" tIns="0" rIns="0" bIns="0" rtlCol="0" anchor="ctr"/>
+          <a:lstStyle/>
+          <a:p>
+            <a:pPr algn="ctr"/>
+            <a:r>
+              <a:rPr lang="en-US" sz="1000">
+                <a:solidFill>
+                  <a:schemeClr val="tx1"/>
+                </a:solidFill>
+                <a:latin typeface="Consolas"/>
+                <a:cs typeface="Consolas"/>
+              </a:rPr>
+              <a:t>APDU#n</a:t>
+            </a:r>
+          </a:p>
+        </p:txBody>
+      </p:sp>
+      <p:sp>
+        <p:nvSpPr>
+          <p:cNvPr id="18" name="Left Brace 17"/>
+          <p:cNvSpPr/>
+          <p:nvPr/>
+        </p:nvSpPr>
+        <p:spPr bwMode="auto">
+          <a:xfrm rot="5400000">
+            <a:off x="4488219" y="-845708"/>
+            <a:ext cx="226742" cy="5961779"/>
+          </a:xfrm>
+          <a:prstGeom prst="leftBrace">
+            <a:avLst>
+              <a:gd name="adj1" fmla="val 38334"/>
+              <a:gd name="adj2" fmla="val 50000"/>
+            </a:avLst>
+          </a:prstGeom>
+          <a:noFill/>
+          <a:ln w="12700" cap="flat" cmpd="sng" algn="ctr">
+            <a:solidFill>
+              <a:schemeClr val="tx1">
+                <a:lumMod val="50000"/>
+              </a:schemeClr>
+            </a:solidFill>
+            <a:prstDash val="solid"/>
+            <a:round/>
+            <a:headEnd type="none" w="med" len="med"/>
+            <a:tailEnd type="none" w="med" len="med"/>
+          </a:ln>
+          <a:effectLst/>
+        </p:spPr>
+        <p:txBody>
+          <a:bodyPr vert="horz" wrap="none" lIns="72000" tIns="45720" rIns="72000" bIns="45720" numCol="1" rtlCol="0" anchor="t" anchorCtr="0" compatLnSpc="1">
+            <a:prstTxWarp prst="textNoShape">
+              <a:avLst/>
+            </a:prstTxWarp>
+          </a:bodyPr>
+          <a:lstStyle/>
+          <a:p>
+            <a:pPr marL="0" marR="0" indent="0" algn="l" defTabSz="914400" rtl="0" eaLnBrk="1" fontAlgn="base" latinLnBrk="0" hangingPunct="1">
+              <a:lnSpc>
+                <a:spcPct val="100000"/>
+              </a:lnSpc>
+              <a:spcBef>
+                <a:spcPct val="50000"/>
+              </a:spcBef>
+              <a:spcAft>
+                <a:spcPct val="0"/>
+              </a:spcAft>
+              <a:buClrTx/>
+              <a:buSzTx/>
+              <a:buFontTx/>
+              <a:buNone/>
+              <a:tabLst/>
+            </a:pPr>
+            <a:endParaRPr kumimoji="0" lang="en-US" sz="2000" b="0" i="0" u="none" strike="noStrike" cap="none" normalizeH="0" baseline="0" smtClean="0">
+              <a:ln>
+                <a:noFill/>
+              </a:ln>
+              <a:solidFill>
+                <a:schemeClr val="tx1"/>
+              </a:solidFill>
+              <a:effectLst/>
+              <a:latin typeface="Arial" charset="0"/>
+            </a:endParaRPr>
+          </a:p>
+        </p:txBody>
+      </p:sp>
+      <p:sp>
+        <p:nvSpPr>
+          <p:cNvPr id="19" name="TextBox 18"/>
+          <p:cNvSpPr txBox="1"/>
+          <p:nvPr/>
+        </p:nvSpPr>
+        <p:spPr>
+          <a:xfrm>
+            <a:off x="2134049" y="1178959"/>
+            <a:ext cx="4145887" cy="246221"/>
+          </a:xfrm>
+          <a:prstGeom prst="rect">
+            <a:avLst/>
+          </a:prstGeom>
+          <a:noFill/>
+        </p:spPr>
+        <p:txBody>
+          <a:bodyPr wrap="none" rtlCol="0">
+            <a:spAutoFit/>
+          </a:bodyPr>
+          <a:lstStyle/>
+          <a:p>
+            <a:r>
+              <a:rPr lang="en-US" sz="1000">
+                <a:latin typeface="Consolas"/>
+                <a:cs typeface="Consolas"/>
+              </a:rPr>
+              <a:t>APDU sequence. Length ≤ “Max Memory for APDU processing”</a:t>
+            </a:r>
+          </a:p>
+        </p:txBody>
+      </p:sp>
+      <p:grpSp>
+        <p:nvGrpSpPr>
+          <p:cNvPr id="28" name="Group 27"/>
+          <p:cNvGrpSpPr/>
+          <p:nvPr/>
+        </p:nvGrpSpPr>
+        <p:grpSpPr>
+          <a:xfrm>
+            <a:off x="1647533" y="2609021"/>
+            <a:ext cx="1859971" cy="261444"/>
+            <a:chOff x="975239" y="1941250"/>
+            <a:chExt cx="1859971" cy="261444"/>
+          </a:xfrm>
+        </p:grpSpPr>
+        <p:sp>
+          <p:nvSpPr>
+            <p:cNvPr id="25" name="Rectangle 24"/>
+            <p:cNvSpPr/>
+            <p:nvPr/>
+          </p:nvSpPr>
+          <p:spPr>
+            <a:xfrm>
+              <a:off x="975239" y="1941250"/>
+              <a:ext cx="266628" cy="261444"/>
+            </a:xfrm>
+            <a:prstGeom prst="rect">
+              <a:avLst/>
+            </a:prstGeom>
+            <a:noFill/>
+            <a:ln w="19050" cmpd="sng">
+              <a:solidFill>
+                <a:schemeClr val="tx1"/>
+              </a:solidFill>
+            </a:ln>
+            <a:effectLst/>
+          </p:spPr>
+          <p:style>
+            <a:lnRef idx="1">
+              <a:schemeClr val="accent1"/>
+            </a:lnRef>
+            <a:fillRef idx="3">
+              <a:schemeClr val="accent1"/>
+            </a:fillRef>
+            <a:effectRef idx="2">
+              <a:schemeClr val="accent1"/>
+            </a:effectRef>
+            <a:fontRef idx="minor">
+              <a:schemeClr val="lt1"/>
+            </a:fontRef>
+          </p:style>
+          <p:txBody>
+            <a:bodyPr lIns="0" tIns="0" rIns="0" bIns="0" rtlCol="0" anchor="ctr"/>
+            <a:lstStyle/>
+            <a:p>
+              <a:pPr algn="ctr"/>
+              <a:r>
+                <a:rPr lang="en-US" sz="1000">
+                  <a:solidFill>
+                    <a:schemeClr val="tx1"/>
+                  </a:solidFill>
+                  <a:latin typeface="Consolas"/>
+                  <a:cs typeface="Consolas"/>
+                </a:rPr>
+                <a:t>tp</a:t>
+              </a:r>
+            </a:p>
+          </p:txBody>
+        </p:sp>
+        <p:sp>
+          <p:nvSpPr>
+            <p:cNvPr id="26" name="Rectangle 25"/>
+            <p:cNvSpPr/>
+            <p:nvPr/>
+          </p:nvSpPr>
+          <p:spPr>
+            <a:xfrm>
+              <a:off x="1241867" y="1941250"/>
+              <a:ext cx="243173" cy="261444"/>
+            </a:xfrm>
+            <a:prstGeom prst="rect">
+              <a:avLst/>
+            </a:prstGeom>
+            <a:noFill/>
+            <a:ln w="19050" cmpd="sng">
+              <a:solidFill>
+                <a:schemeClr val="tx1"/>
+              </a:solidFill>
+            </a:ln>
+            <a:effectLst/>
+          </p:spPr>
+          <p:style>
+            <a:lnRef idx="1">
+              <a:schemeClr val="accent1"/>
+            </a:lnRef>
+            <a:fillRef idx="3">
+              <a:schemeClr val="accent1"/>
+            </a:fillRef>
+            <a:effectRef idx="2">
+              <a:schemeClr val="accent1"/>
+            </a:effectRef>
+            <a:fontRef idx="minor">
+              <a:schemeClr val="lt1"/>
+            </a:fontRef>
+          </p:style>
+          <p:txBody>
+            <a:bodyPr lIns="0" tIns="0" rIns="0" bIns="0" rtlCol="0" anchor="ctr"/>
+            <a:lstStyle/>
+            <a:p>
+              <a:pPr algn="ctr"/>
+              <a:r>
+                <a:rPr lang="en-US" sz="1000">
+                  <a:solidFill>
+                    <a:schemeClr val="tx1"/>
+                  </a:solidFill>
+                  <a:latin typeface="Consolas"/>
+                  <a:cs typeface="Consolas"/>
+                </a:rPr>
+                <a:t>pn</a:t>
+              </a:r>
+            </a:p>
+          </p:txBody>
+        </p:sp>
+        <p:sp>
+          <p:nvSpPr>
+            <p:cNvPr id="27" name="Rectangle 26"/>
+            <p:cNvSpPr/>
+            <p:nvPr/>
+          </p:nvSpPr>
+          <p:spPr>
+            <a:xfrm>
+              <a:off x="1485038" y="1941250"/>
+              <a:ext cx="1350172" cy="261444"/>
+            </a:xfrm>
+            <a:prstGeom prst="rect">
+              <a:avLst/>
+            </a:prstGeom>
+            <a:noFill/>
+            <a:ln w="19050" cmpd="sng">
+              <a:solidFill>
+                <a:schemeClr val="tx1"/>
+              </a:solidFill>
+            </a:ln>
+            <a:effectLst/>
+          </p:spPr>
+          <p:style>
+            <a:lnRef idx="1">
+              <a:schemeClr val="accent1"/>
+            </a:lnRef>
+            <a:fillRef idx="3">
+              <a:schemeClr val="accent1"/>
+            </a:fillRef>
+            <a:effectRef idx="2">
+              <a:schemeClr val="accent1"/>
+            </a:effectRef>
+            <a:fontRef idx="minor">
+              <a:schemeClr val="lt1"/>
+            </a:fontRef>
+          </p:style>
+          <p:txBody>
+            <a:bodyPr lIns="0" tIns="0" rIns="0" bIns="0" rtlCol="0" anchor="ctr"/>
+            <a:lstStyle/>
+            <a:p>
+              <a:pPr algn="ctr"/>
+              <a:r>
+                <a:rPr lang="en-US" sz="1000">
+                  <a:solidFill>
+                    <a:schemeClr val="tx1"/>
+                  </a:solidFill>
+                  <a:latin typeface="Consolas"/>
+                  <a:cs typeface="Consolas"/>
+                </a:rPr>
+                <a:t>data</a:t>
+              </a:r>
+            </a:p>
+          </p:txBody>
+        </p:sp>
+      </p:grpSp>
+      <p:grpSp>
+        <p:nvGrpSpPr>
+          <p:cNvPr id="29" name="Group 28"/>
+          <p:cNvGrpSpPr/>
+          <p:nvPr/>
+        </p:nvGrpSpPr>
+        <p:grpSpPr>
+          <a:xfrm>
+            <a:off x="3692959" y="2609021"/>
+            <a:ext cx="1859971" cy="261444"/>
+            <a:chOff x="975239" y="1941250"/>
+            <a:chExt cx="1859971" cy="261444"/>
+          </a:xfrm>
+        </p:grpSpPr>
+        <p:sp>
+          <p:nvSpPr>
+            <p:cNvPr id="30" name="Rectangle 29"/>
+            <p:cNvSpPr/>
+            <p:nvPr/>
+          </p:nvSpPr>
+          <p:spPr>
+            <a:xfrm>
+              <a:off x="975239" y="1941250"/>
+              <a:ext cx="266628" cy="261444"/>
+            </a:xfrm>
+            <a:prstGeom prst="rect">
+              <a:avLst/>
+            </a:prstGeom>
+            <a:noFill/>
+            <a:ln w="19050" cmpd="sng">
+              <a:solidFill>
+                <a:schemeClr val="tx1"/>
+              </a:solidFill>
+            </a:ln>
+            <a:effectLst/>
+          </p:spPr>
+          <p:style>
+            <a:lnRef idx="1">
+              <a:schemeClr val="accent1"/>
+            </a:lnRef>
+            <a:fillRef idx="3">
+              <a:schemeClr val="accent1"/>
+            </a:fillRef>
+            <a:effectRef idx="2">
+              <a:schemeClr val="accent1"/>
+            </a:effectRef>
+            <a:fontRef idx="minor">
+              <a:schemeClr val="lt1"/>
+            </a:fontRef>
+          </p:style>
+          <p:txBody>
+            <a:bodyPr lIns="0" tIns="0" rIns="0" bIns="0" rtlCol="0" anchor="ctr"/>
+            <a:lstStyle/>
+            <a:p>
+              <a:pPr algn="ctr"/>
+              <a:r>
+                <a:rPr lang="en-US" sz="1000">
+                  <a:solidFill>
+                    <a:schemeClr val="tx1"/>
+                  </a:solidFill>
+                  <a:latin typeface="Consolas"/>
+                  <a:cs typeface="Consolas"/>
+                </a:rPr>
+                <a:t>tp</a:t>
+              </a:r>
+            </a:p>
+          </p:txBody>
+        </p:sp>
+        <p:sp>
+          <p:nvSpPr>
+            <p:cNvPr id="31" name="Rectangle 30"/>
+            <p:cNvSpPr/>
+            <p:nvPr/>
+          </p:nvSpPr>
+          <p:spPr>
+            <a:xfrm>
+              <a:off x="1241867" y="1941250"/>
+              <a:ext cx="243173" cy="261444"/>
+            </a:xfrm>
+            <a:prstGeom prst="rect">
+              <a:avLst/>
+            </a:prstGeom>
+            <a:noFill/>
+            <a:ln w="19050" cmpd="sng">
+              <a:solidFill>
+                <a:schemeClr val="tx1"/>
+              </a:solidFill>
+            </a:ln>
+            <a:effectLst/>
+          </p:spPr>
+          <p:style>
+            <a:lnRef idx="1">
+              <a:schemeClr val="accent1"/>
+            </a:lnRef>
+            <a:fillRef idx="3">
+              <a:schemeClr val="accent1"/>
+            </a:fillRef>
+            <a:effectRef idx="2">
+              <a:schemeClr val="accent1"/>
+            </a:effectRef>
+            <a:fontRef idx="minor">
+              <a:schemeClr val="lt1"/>
+            </a:fontRef>
+          </p:style>
+          <p:txBody>
+            <a:bodyPr lIns="0" tIns="0" rIns="0" bIns="0" rtlCol="0" anchor="ctr"/>
+            <a:lstStyle/>
+            <a:p>
+              <a:pPr algn="ctr"/>
+              <a:r>
+                <a:rPr lang="en-US" sz="1000">
+                  <a:solidFill>
+                    <a:schemeClr val="tx1"/>
+                  </a:solidFill>
+                  <a:latin typeface="Consolas"/>
+                  <a:cs typeface="Consolas"/>
+                </a:rPr>
+                <a:t>pn</a:t>
+              </a:r>
+            </a:p>
+          </p:txBody>
+        </p:sp>
+        <p:sp>
+          <p:nvSpPr>
+            <p:cNvPr id="32" name="Rectangle 31"/>
+            <p:cNvSpPr/>
+            <p:nvPr/>
+          </p:nvSpPr>
+          <p:spPr>
+            <a:xfrm>
+              <a:off x="1485038" y="1941250"/>
+              <a:ext cx="1350172" cy="261444"/>
+            </a:xfrm>
+            <a:prstGeom prst="rect">
+              <a:avLst/>
+            </a:prstGeom>
+            <a:noFill/>
+            <a:ln w="19050" cmpd="sng">
+              <a:solidFill>
+                <a:schemeClr val="tx1"/>
+              </a:solidFill>
+            </a:ln>
+            <a:effectLst/>
+          </p:spPr>
+          <p:style>
+            <a:lnRef idx="1">
+              <a:schemeClr val="accent1"/>
+            </a:lnRef>
+            <a:fillRef idx="3">
+              <a:schemeClr val="accent1"/>
+            </a:fillRef>
+            <a:effectRef idx="2">
+              <a:schemeClr val="accent1"/>
+            </a:effectRef>
+            <a:fontRef idx="minor">
+              <a:schemeClr val="lt1"/>
+            </a:fontRef>
+          </p:style>
+          <p:txBody>
+            <a:bodyPr lIns="0" tIns="0" rIns="0" bIns="0" rtlCol="0" anchor="ctr"/>
+            <a:lstStyle/>
+            <a:p>
+              <a:pPr algn="ctr"/>
+              <a:r>
+                <a:rPr lang="en-US" sz="1000">
+                  <a:solidFill>
+                    <a:schemeClr val="tx1"/>
+                  </a:solidFill>
+                  <a:latin typeface="Consolas"/>
+                  <a:cs typeface="Consolas"/>
+                </a:rPr>
+                <a:t>data</a:t>
+              </a:r>
+            </a:p>
+          </p:txBody>
+        </p:sp>
+      </p:grpSp>
+      <p:grpSp>
+        <p:nvGrpSpPr>
+          <p:cNvPr id="33" name="Group 32"/>
+          <p:cNvGrpSpPr/>
+          <p:nvPr/>
+        </p:nvGrpSpPr>
+        <p:grpSpPr>
+          <a:xfrm>
+            <a:off x="5722509" y="2596980"/>
+            <a:ext cx="1859971" cy="261444"/>
+            <a:chOff x="975239" y="1941250"/>
+            <a:chExt cx="1859971" cy="261444"/>
+          </a:xfrm>
+        </p:grpSpPr>
+        <p:sp>
+          <p:nvSpPr>
+            <p:cNvPr id="34" name="Rectangle 33"/>
+            <p:cNvSpPr/>
+            <p:nvPr/>
+          </p:nvSpPr>
+          <p:spPr>
+            <a:xfrm>
+              <a:off x="975239" y="1941250"/>
+              <a:ext cx="266628" cy="261444"/>
+            </a:xfrm>
+            <a:prstGeom prst="rect">
+              <a:avLst/>
+            </a:prstGeom>
+            <a:noFill/>
+            <a:ln w="19050" cmpd="sng">
+              <a:solidFill>
+                <a:schemeClr val="tx1"/>
+              </a:solidFill>
+            </a:ln>
+            <a:effectLst/>
+          </p:spPr>
+          <p:style>
+            <a:lnRef idx="1">
+              <a:schemeClr val="accent1"/>
+            </a:lnRef>
+            <a:fillRef idx="3">
+              <a:schemeClr val="accent1"/>
+            </a:fillRef>
+            <a:effectRef idx="2">
+              <a:schemeClr val="accent1"/>
+            </a:effectRef>
+            <a:fontRef idx="minor">
+              <a:schemeClr val="lt1"/>
+            </a:fontRef>
+          </p:style>
+          <p:txBody>
+            <a:bodyPr lIns="0" tIns="0" rIns="0" bIns="0" rtlCol="0" anchor="ctr"/>
+            <a:lstStyle/>
+            <a:p>
+              <a:pPr algn="ctr"/>
+              <a:r>
+                <a:rPr lang="en-US" sz="1000">
+                  <a:solidFill>
+                    <a:schemeClr val="tx1"/>
+                  </a:solidFill>
+                  <a:latin typeface="Consolas"/>
+                  <a:cs typeface="Consolas"/>
+                </a:rPr>
+                <a:t>tp</a:t>
+              </a:r>
+            </a:p>
+          </p:txBody>
+        </p:sp>
+        <p:sp>
+          <p:nvSpPr>
+            <p:cNvPr id="35" name="Rectangle 34"/>
+            <p:cNvSpPr/>
+            <p:nvPr/>
+          </p:nvSpPr>
+          <p:spPr>
+            <a:xfrm>
+              <a:off x="1241867" y="1941250"/>
+              <a:ext cx="243173" cy="261444"/>
+            </a:xfrm>
+            <a:prstGeom prst="rect">
+              <a:avLst/>
+            </a:prstGeom>
+            <a:noFill/>
+            <a:ln w="19050" cmpd="sng">
+              <a:solidFill>
+                <a:schemeClr val="tx1"/>
+              </a:solidFill>
+            </a:ln>
+            <a:effectLst/>
+          </p:spPr>
+          <p:style>
+            <a:lnRef idx="1">
+              <a:schemeClr val="accent1"/>
+            </a:lnRef>
+            <a:fillRef idx="3">
+              <a:schemeClr val="accent1"/>
+            </a:fillRef>
+            <a:effectRef idx="2">
+              <a:schemeClr val="accent1"/>
+            </a:effectRef>
+            <a:fontRef idx="minor">
+              <a:schemeClr val="lt1"/>
+            </a:fontRef>
+          </p:style>
+          <p:txBody>
+            <a:bodyPr lIns="0" tIns="0" rIns="0" bIns="0" rtlCol="0" anchor="ctr"/>
+            <a:lstStyle/>
+            <a:p>
+              <a:pPr algn="ctr"/>
+              <a:r>
+                <a:rPr lang="en-US" sz="1000">
+                  <a:solidFill>
+                    <a:schemeClr val="tx1"/>
+                  </a:solidFill>
+                  <a:latin typeface="Consolas"/>
+                  <a:cs typeface="Consolas"/>
+                </a:rPr>
+                <a:t>pn</a:t>
+              </a:r>
+            </a:p>
+          </p:txBody>
+        </p:sp>
+        <p:sp>
+          <p:nvSpPr>
+            <p:cNvPr id="36" name="Rectangle 35"/>
+            <p:cNvSpPr/>
+            <p:nvPr/>
+          </p:nvSpPr>
+          <p:spPr>
+            <a:xfrm>
+              <a:off x="1485038" y="1941250"/>
+              <a:ext cx="1350172" cy="261444"/>
+            </a:xfrm>
+            <a:prstGeom prst="rect">
+              <a:avLst/>
+            </a:prstGeom>
+            <a:noFill/>
+            <a:ln w="19050" cmpd="sng">
+              <a:solidFill>
+                <a:schemeClr val="tx1"/>
+              </a:solidFill>
+            </a:ln>
+            <a:effectLst/>
+          </p:spPr>
+          <p:style>
+            <a:lnRef idx="1">
+              <a:schemeClr val="accent1"/>
+            </a:lnRef>
+            <a:fillRef idx="3">
+              <a:schemeClr val="accent1"/>
+            </a:fillRef>
+            <a:effectRef idx="2">
+              <a:schemeClr val="accent1"/>
+            </a:effectRef>
+            <a:fontRef idx="minor">
+              <a:schemeClr val="lt1"/>
+            </a:fontRef>
+          </p:style>
+          <p:txBody>
+            <a:bodyPr lIns="0" tIns="0" rIns="0" bIns="0" rtlCol="0" anchor="ctr"/>
+            <a:lstStyle/>
+            <a:p>
+              <a:pPr algn="ctr"/>
+              <a:r>
+                <a:rPr lang="en-US" sz="1000">
+                  <a:solidFill>
+                    <a:schemeClr val="tx1"/>
+                  </a:solidFill>
+                  <a:latin typeface="Consolas"/>
+                  <a:cs typeface="Consolas"/>
+                </a:rPr>
+                <a:t>data</a:t>
+              </a:r>
+            </a:p>
+          </p:txBody>
+        </p:sp>
+      </p:grpSp>
+      <p:sp>
+        <p:nvSpPr>
+          <p:cNvPr id="37" name="TextBox 36"/>
+          <p:cNvSpPr txBox="1"/>
+          <p:nvPr/>
+        </p:nvSpPr>
+        <p:spPr>
+          <a:xfrm>
+            <a:off x="1575981" y="2331051"/>
+            <a:ext cx="5979071" cy="246221"/>
+          </a:xfrm>
+          <a:prstGeom prst="rect">
+            <a:avLst/>
+          </a:prstGeom>
+          <a:noFill/>
+        </p:spPr>
+        <p:txBody>
+          <a:bodyPr wrap="none" rtlCol="0">
+            <a:spAutoFit/>
+          </a:bodyPr>
+          <a:lstStyle/>
+          <a:p>
+            <a:r>
+              <a:rPr lang="en-US" sz="1000">
+                <a:latin typeface="Consolas"/>
+                <a:cs typeface="Consolas"/>
+              </a:rPr>
+              <a:t>APDU command packets. Max length = length for ‘APDU Commands’ write characteristic</a:t>
+            </a:r>
+          </a:p>
+        </p:txBody>
+      </p:sp>
+      <p:sp>
+        <p:nvSpPr>
+          <p:cNvPr id="38" name="TextBox 37"/>
+          <p:cNvSpPr txBox="1"/>
+          <p:nvPr/>
+        </p:nvSpPr>
+        <p:spPr>
+          <a:xfrm>
+            <a:off x="1620700" y="3030766"/>
+            <a:ext cx="1665315" cy="400110"/>
+          </a:xfrm>
+          <a:prstGeom prst="rect">
+            <a:avLst/>
+          </a:prstGeom>
+          <a:noFill/>
+        </p:spPr>
+        <p:txBody>
+          <a:bodyPr wrap="none" rtlCol="0">
+            <a:spAutoFit/>
+          </a:bodyPr>
+          <a:lstStyle/>
+          <a:p>
+            <a:r>
+              <a:rPr lang="en-US" sz="1000">
+                <a:latin typeface="Consolas"/>
+                <a:cs typeface="Consolas"/>
+              </a:rPr>
+              <a:t>‘APDU Commands’ write </a:t>
+            </a:r>
+          </a:p>
+          <a:p>
+            <a:r>
+              <a:rPr lang="en-US" sz="1000">
+                <a:latin typeface="Consolas"/>
+                <a:cs typeface="Consolas"/>
+              </a:rPr>
+              <a:t>characteristic</a:t>
+            </a:r>
+          </a:p>
+        </p:txBody>
+      </p:sp>
+      <p:sp>
+        <p:nvSpPr>
+          <p:cNvPr id="39" name="Down Arrow 38"/>
+          <p:cNvSpPr/>
+          <p:nvPr/>
+        </p:nvSpPr>
+        <p:spPr>
+          <a:xfrm rot="16200000">
+            <a:off x="5221557" y="3547455"/>
+            <a:ext cx="280709" cy="1422184"/>
+          </a:xfrm>
+          <a:prstGeom prst="downArrow">
+            <a:avLst/>
+          </a:prstGeom>
+          <a:noFill/>
+          <a:ln w="19050" cmpd="sng">
+            <a:solidFill>
+              <a:schemeClr val="tx1"/>
+            </a:solidFill>
+          </a:ln>
+          <a:effectLst/>
+        </p:spPr>
+        <p:style>
+          <a:lnRef idx="1">
+            <a:schemeClr val="accent1"/>
+          </a:lnRef>
+          <a:fillRef idx="3">
+            <a:schemeClr val="accent1"/>
+          </a:fillRef>
+          <a:effectRef idx="2">
+            <a:schemeClr val="accent1"/>
+          </a:effectRef>
+          <a:fontRef idx="minor">
+            <a:schemeClr val="lt1"/>
+          </a:fontRef>
+        </p:style>
+        <p:txBody>
+          <a:bodyPr rtlCol="0" anchor="ctr"/>
+          <a:lstStyle/>
+          <a:p>
+            <a:pPr algn="ctr"/>
+            <a:endParaRPr lang="en-US" sz="1400">
+              <a:solidFill>
+                <a:schemeClr val="tx1"/>
+              </a:solidFill>
+            </a:endParaRPr>
+          </a:p>
+        </p:txBody>
+      </p:sp>
+      <p:sp>
+        <p:nvSpPr>
+          <p:cNvPr id="40" name="Rectangle 39"/>
+          <p:cNvSpPr/>
+          <p:nvPr/>
+        </p:nvSpPr>
+        <p:spPr>
+          <a:xfrm>
+            <a:off x="1140078" y="4137458"/>
+            <a:ext cx="459496" cy="261444"/>
+          </a:xfrm>
+          <a:prstGeom prst="rect">
+            <a:avLst/>
+          </a:prstGeom>
+          <a:noFill/>
+          <a:ln w="19050" cmpd="sng">
+            <a:solidFill>
+              <a:schemeClr val="tx1"/>
+            </a:solidFill>
+          </a:ln>
+          <a:effectLst/>
+        </p:spPr>
+        <p:style>
+          <a:lnRef idx="1">
+            <a:schemeClr val="accent1"/>
+          </a:lnRef>
+          <a:fillRef idx="3">
+            <a:schemeClr val="accent1"/>
+          </a:fillRef>
+          <a:effectRef idx="2">
+            <a:schemeClr val="accent1"/>
+          </a:effectRef>
+          <a:fontRef idx="minor">
+            <a:schemeClr val="lt1"/>
+          </a:fontRef>
+        </p:style>
+        <p:txBody>
+          <a:bodyPr lIns="0" tIns="0" rIns="0" bIns="0" rtlCol="0" anchor="ctr"/>
+          <a:lstStyle/>
+          <a:p>
+            <a:pPr algn="ctr"/>
+            <a:r>
+              <a:rPr lang="en-US" sz="1000">
+                <a:solidFill>
+                  <a:schemeClr val="tx1"/>
+                </a:solidFill>
+                <a:latin typeface="Consolas"/>
+                <a:cs typeface="Consolas"/>
+              </a:rPr>
+              <a:t>ble</a:t>
+            </a:r>
+            <a:endParaRPr lang="en-US" sz="1000">
+              <a:solidFill>
+                <a:schemeClr val="tx1"/>
+              </a:solidFill>
+              <a:latin typeface="Consolas"/>
+              <a:cs typeface="Consolas"/>
+            </a:endParaRPr>
+          </a:p>
+        </p:txBody>
+      </p:sp>
+      <p:sp>
+        <p:nvSpPr>
+          <p:cNvPr id="41" name="Rectangle 40"/>
+          <p:cNvSpPr/>
+          <p:nvPr/>
+        </p:nvSpPr>
+        <p:spPr>
+          <a:xfrm>
+            <a:off x="1720324" y="4137458"/>
+            <a:ext cx="459496" cy="261444"/>
+          </a:xfrm>
+          <a:prstGeom prst="rect">
+            <a:avLst/>
+          </a:prstGeom>
+          <a:noFill/>
+          <a:ln w="19050" cmpd="sng">
+            <a:solidFill>
+              <a:schemeClr val="tx1"/>
+            </a:solidFill>
+          </a:ln>
+          <a:effectLst/>
+        </p:spPr>
+        <p:style>
+          <a:lnRef idx="1">
+            <a:schemeClr val="accent1"/>
+          </a:lnRef>
+          <a:fillRef idx="3">
+            <a:schemeClr val="accent1"/>
+          </a:fillRef>
+          <a:effectRef idx="2">
+            <a:schemeClr val="accent1"/>
+          </a:effectRef>
+          <a:fontRef idx="minor">
+            <a:schemeClr val="lt1"/>
+          </a:fontRef>
+        </p:style>
+        <p:txBody>
+          <a:bodyPr lIns="0" tIns="0" rIns="0" bIns="0" rtlCol="0" anchor="ctr"/>
+          <a:lstStyle/>
+          <a:p>
+            <a:pPr algn="ctr"/>
+            <a:r>
+              <a:rPr lang="en-US" sz="1000">
+                <a:solidFill>
+                  <a:schemeClr val="tx1"/>
+                </a:solidFill>
+                <a:latin typeface="Consolas"/>
+                <a:cs typeface="Consolas"/>
+              </a:rPr>
+              <a:t>ble</a:t>
+            </a:r>
+            <a:endParaRPr lang="en-US" sz="1000">
+              <a:solidFill>
+                <a:schemeClr val="tx1"/>
+              </a:solidFill>
+              <a:latin typeface="Consolas"/>
+              <a:cs typeface="Consolas"/>
+            </a:endParaRPr>
+          </a:p>
+        </p:txBody>
+      </p:sp>
+      <p:sp>
+        <p:nvSpPr>
+          <p:cNvPr id="42" name="Rectangle 41"/>
+          <p:cNvSpPr/>
+          <p:nvPr/>
+        </p:nvSpPr>
+        <p:spPr>
+          <a:xfrm>
+            <a:off x="2300570" y="4137458"/>
+            <a:ext cx="459496" cy="261444"/>
+          </a:xfrm>
+          <a:prstGeom prst="rect">
+            <a:avLst/>
+          </a:prstGeom>
+          <a:noFill/>
+          <a:ln w="19050" cmpd="sng">
+            <a:solidFill>
+              <a:schemeClr val="tx1"/>
+            </a:solidFill>
+          </a:ln>
+          <a:effectLst/>
+        </p:spPr>
+        <p:style>
+          <a:lnRef idx="1">
+            <a:schemeClr val="accent1"/>
+          </a:lnRef>
+          <a:fillRef idx="3">
+            <a:schemeClr val="accent1"/>
+          </a:fillRef>
+          <a:effectRef idx="2">
+            <a:schemeClr val="accent1"/>
+          </a:effectRef>
+          <a:fontRef idx="minor">
+            <a:schemeClr val="lt1"/>
+          </a:fontRef>
+        </p:style>
+        <p:txBody>
+          <a:bodyPr lIns="0" tIns="0" rIns="0" bIns="0" rtlCol="0" anchor="ctr"/>
+          <a:lstStyle/>
+          <a:p>
+            <a:pPr algn="ctr"/>
+            <a:r>
+              <a:rPr lang="en-US" sz="1000">
+                <a:solidFill>
+                  <a:schemeClr val="tx1"/>
+                </a:solidFill>
+                <a:latin typeface="Consolas"/>
+                <a:cs typeface="Consolas"/>
+              </a:rPr>
+              <a:t>ble</a:t>
+            </a:r>
+            <a:endParaRPr lang="en-US" sz="1000">
+              <a:solidFill>
+                <a:schemeClr val="tx1"/>
+              </a:solidFill>
+              <a:latin typeface="Consolas"/>
+              <a:cs typeface="Consolas"/>
+            </a:endParaRPr>
+          </a:p>
+        </p:txBody>
+      </p:sp>
+      <p:sp>
+        <p:nvSpPr>
+          <p:cNvPr id="43" name="Rectangle 42"/>
+          <p:cNvSpPr/>
+          <p:nvPr/>
+        </p:nvSpPr>
+        <p:spPr>
+          <a:xfrm>
+            <a:off x="2880815" y="4137458"/>
+            <a:ext cx="459496" cy="261444"/>
+          </a:xfrm>
+          <a:prstGeom prst="rect">
+            <a:avLst/>
+          </a:prstGeom>
+          <a:noFill/>
+          <a:ln w="19050" cmpd="sng">
+            <a:solidFill>
+              <a:schemeClr val="tx1"/>
+            </a:solidFill>
+          </a:ln>
+          <a:effectLst/>
+        </p:spPr>
+        <p:style>
+          <a:lnRef idx="1">
+            <a:schemeClr val="accent1"/>
+          </a:lnRef>
+          <a:fillRef idx="3">
+            <a:schemeClr val="accent1"/>
+          </a:fillRef>
+          <a:effectRef idx="2">
+            <a:schemeClr val="accent1"/>
+          </a:effectRef>
+          <a:fontRef idx="minor">
+            <a:schemeClr val="lt1"/>
+          </a:fontRef>
+        </p:style>
+        <p:txBody>
+          <a:bodyPr lIns="0" tIns="0" rIns="0" bIns="0" rtlCol="0" anchor="ctr"/>
+          <a:lstStyle/>
+          <a:p>
+            <a:pPr algn="ctr"/>
+            <a:r>
+              <a:rPr lang="en-US" sz="1000">
+                <a:solidFill>
+                  <a:schemeClr val="tx1"/>
+                </a:solidFill>
+                <a:latin typeface="Consolas"/>
+                <a:cs typeface="Consolas"/>
+              </a:rPr>
+              <a:t>ble</a:t>
+            </a:r>
+            <a:endParaRPr lang="en-US" sz="1000">
+              <a:solidFill>
+                <a:schemeClr val="tx1"/>
+              </a:solidFill>
+              <a:latin typeface="Consolas"/>
+              <a:cs typeface="Consolas"/>
+            </a:endParaRPr>
+          </a:p>
+        </p:txBody>
+      </p:sp>
+      <p:sp>
+        <p:nvSpPr>
+          <p:cNvPr id="44" name="TextBox 43"/>
+          <p:cNvSpPr txBox="1"/>
+          <p:nvPr/>
+        </p:nvSpPr>
+        <p:spPr>
+          <a:xfrm>
+            <a:off x="1092456" y="3764195"/>
+            <a:ext cx="2236510" cy="246221"/>
+          </a:xfrm>
+          <a:prstGeom prst="rect">
+            <a:avLst/>
+          </a:prstGeom>
+          <a:noFill/>
+        </p:spPr>
+        <p:txBody>
+          <a:bodyPr wrap="none" rtlCol="0">
+            <a:spAutoFit/>
+          </a:bodyPr>
+          <a:lstStyle/>
+          <a:p>
+            <a:r>
+              <a:rPr lang="en-US" sz="1000">
+                <a:latin typeface="Consolas"/>
+                <a:cs typeface="Consolas"/>
+              </a:rPr>
+              <a:t>BLE packets. Max length = MTU</a:t>
+            </a:r>
+          </a:p>
+        </p:txBody>
+      </p:sp>
+      <p:sp>
+        <p:nvSpPr>
+          <p:cNvPr id="45" name="Left Brace 44"/>
+          <p:cNvSpPr/>
+          <p:nvPr/>
+        </p:nvSpPr>
+        <p:spPr bwMode="auto">
+          <a:xfrm rot="5400000">
+            <a:off x="2421191" y="2260875"/>
+            <a:ext cx="226742" cy="2779900"/>
+          </a:xfrm>
+          <a:prstGeom prst="leftBrace">
+            <a:avLst>
+              <a:gd name="adj1" fmla="val 38334"/>
+              <a:gd name="adj2" fmla="val 50000"/>
+            </a:avLst>
+          </a:prstGeom>
+          <a:noFill/>
+          <a:ln w="12700" cap="flat" cmpd="sng" algn="ctr">
+            <a:solidFill>
+              <a:schemeClr val="tx1">
+                <a:lumMod val="50000"/>
+              </a:schemeClr>
+            </a:solidFill>
+            <a:prstDash val="solid"/>
+            <a:round/>
+            <a:headEnd type="none" w="med" len="med"/>
+            <a:tailEnd type="none" w="med" len="med"/>
+          </a:ln>
+          <a:effectLst/>
+        </p:spPr>
+        <p:txBody>
+          <a:bodyPr vert="horz" wrap="none" lIns="72000" tIns="45720" rIns="72000" bIns="45720" numCol="1" rtlCol="0" anchor="t" anchorCtr="0" compatLnSpc="1">
+            <a:prstTxWarp prst="textNoShape">
+              <a:avLst/>
+            </a:prstTxWarp>
+          </a:bodyPr>
+          <a:lstStyle/>
+          <a:p>
+            <a:pPr marL="0" marR="0" indent="0" algn="l" defTabSz="914400" rtl="0" eaLnBrk="1" fontAlgn="base" latinLnBrk="0" hangingPunct="1">
+              <a:lnSpc>
+                <a:spcPct val="100000"/>
+              </a:lnSpc>
+              <a:spcBef>
+                <a:spcPct val="50000"/>
+              </a:spcBef>
+              <a:spcAft>
+                <a:spcPct val="0"/>
+              </a:spcAft>
+              <a:buClrTx/>
+              <a:buSzTx/>
+              <a:buFontTx/>
+              <a:buNone/>
+              <a:tabLst/>
+            </a:pPr>
+            <a:endParaRPr kumimoji="0" lang="en-US" sz="2000" b="0" i="0" u="none" strike="noStrike" cap="none" normalizeH="0" baseline="0" smtClean="0">
+              <a:ln>
+                <a:noFill/>
+              </a:ln>
+              <a:solidFill>
+                <a:schemeClr val="tx1"/>
+              </a:solidFill>
+              <a:effectLst/>
+              <a:latin typeface="Arial" charset="0"/>
+            </a:endParaRPr>
+          </a:p>
+        </p:txBody>
+      </p:sp>
+      <p:sp>
+        <p:nvSpPr>
+          <p:cNvPr id="46" name="Rectangle 45"/>
+          <p:cNvSpPr/>
+          <p:nvPr/>
+        </p:nvSpPr>
+        <p:spPr>
+          <a:xfrm>
+            <a:off x="3465016" y="4136138"/>
+            <a:ext cx="459496" cy="261444"/>
+          </a:xfrm>
+          <a:prstGeom prst="rect">
+            <a:avLst/>
+          </a:prstGeom>
+          <a:noFill/>
+          <a:ln w="19050" cmpd="sng">
+            <a:solidFill>
+              <a:schemeClr val="tx1"/>
+            </a:solidFill>
+          </a:ln>
+          <a:effectLst/>
+        </p:spPr>
+        <p:style>
+          <a:lnRef idx="1">
+            <a:schemeClr val="accent1"/>
+          </a:lnRef>
+          <a:fillRef idx="3">
+            <a:schemeClr val="accent1"/>
+          </a:fillRef>
+          <a:effectRef idx="2">
+            <a:schemeClr val="accent1"/>
+          </a:effectRef>
+          <a:fontRef idx="minor">
+            <a:schemeClr val="lt1"/>
+          </a:fontRef>
+        </p:style>
+        <p:txBody>
+          <a:bodyPr lIns="0" tIns="0" rIns="0" bIns="0" rtlCol="0" anchor="ctr"/>
+          <a:lstStyle/>
+          <a:p>
+            <a:pPr algn="ctr"/>
+            <a:r>
+              <a:rPr lang="en-US" sz="1000">
+                <a:solidFill>
+                  <a:schemeClr val="tx1"/>
+                </a:solidFill>
+                <a:latin typeface="Consolas"/>
+                <a:cs typeface="Consolas"/>
+              </a:rPr>
+              <a:t>ble</a:t>
+            </a:r>
+            <a:endParaRPr lang="en-US" sz="1000">
+              <a:solidFill>
+                <a:schemeClr val="tx1"/>
+              </a:solidFill>
+              <a:latin typeface="Consolas"/>
+              <a:cs typeface="Consolas"/>
+            </a:endParaRPr>
+          </a:p>
+        </p:txBody>
+      </p:sp>
+      <p:sp>
+        <p:nvSpPr>
+          <p:cNvPr id="48" name="TextBox 47"/>
+          <p:cNvSpPr txBox="1"/>
+          <p:nvPr/>
+        </p:nvSpPr>
+        <p:spPr>
+          <a:xfrm>
+            <a:off x="6441046" y="4032780"/>
+            <a:ext cx="1671054" cy="400110"/>
+          </a:xfrm>
+          <a:prstGeom prst="rect">
+            <a:avLst/>
+          </a:prstGeom>
+          <a:noFill/>
+        </p:spPr>
+        <p:txBody>
+          <a:bodyPr wrap="square" rtlCol="0">
+            <a:spAutoFit/>
+          </a:bodyPr>
+          <a:lstStyle/>
+          <a:p>
+            <a:r>
+              <a:rPr lang="en-US" sz="1000">
+                <a:latin typeface="Consolas"/>
+                <a:cs typeface="Consolas"/>
+              </a:rPr>
+              <a:t>Packets actually transmitted</a:t>
+            </a:r>
+          </a:p>
+        </p:txBody>
+      </p:sp>
+    </p:spTree>
+    <p:extLst>
+      <p:ext uri="{BB962C8B-B14F-4D97-AF65-F5344CB8AC3E}">
+        <p14:creationId xmlns:p14="http://schemas.microsoft.com/office/powerpoint/2010/main" val="2222371330"/>
       </p:ext>
     </p:extLst>
   </p:cSld>

</xml_diff>